<commit_message>
add all EM and k-means slides
</commit_message>
<xml_diff>
--- a/presentation.pptx
+++ b/presentation.pptx
@@ -6,14 +6,18 @@
     <p:sldMasterId id="2147483669" r:id="rId2"/>
   </p:sldMasterIdLst>
   <p:sldIdLst>
-    <p:sldId id="256" r:id="rId3"/>
-    <p:sldId id="260" r:id="rId4"/>
-    <p:sldId id="257" r:id="rId5"/>
-    <p:sldId id="258" r:id="rId6"/>
-    <p:sldId id="259" r:id="rId7"/>
-    <p:sldId id="261" r:id="rId8"/>
-    <p:sldId id="262" r:id="rId9"/>
-    <p:sldId id="263" r:id="rId10"/>
+    <p:sldId id="266" r:id="rId3"/>
+    <p:sldId id="256" r:id="rId4"/>
+    <p:sldId id="260" r:id="rId5"/>
+    <p:sldId id="257" r:id="rId6"/>
+    <p:sldId id="258" r:id="rId7"/>
+    <p:sldId id="259" r:id="rId8"/>
+    <p:sldId id="261" r:id="rId9"/>
+    <p:sldId id="262" r:id="rId10"/>
+    <p:sldId id="263" r:id="rId11"/>
+    <p:sldId id="264" r:id="rId12"/>
+    <p:sldId id="265" r:id="rId13"/>
+    <p:sldId id="267" r:id="rId14"/>
   </p:sldIdLst>
   <p:sldSz cx="12192000" cy="6858000"/>
   <p:notesSz cx="6858000" cy="9144000"/>
@@ -324,7 +328,7 @@
           <a:p>
             <a:fld id="{ECD19FB2-3AAB-4D03-B13A-2960828C78E3}" type="datetimeFigureOut">
               <a:rPr lang="en-US" dirty="0"/>
-              <a:t>3/27/2016</a:t>
+              <a:t>3/28/2016</a:t>
             </a:fld>
             <a:endParaRPr lang="en-US" dirty="0"/>
           </a:p>
@@ -636,7 +640,7 @@
           <a:p>
             <a:fld id="{1B80C674-7DFC-42FE-B9CD-82963CDB1557}" type="datetimeFigureOut">
               <a:rPr lang="en-US" dirty="0"/>
-              <a:t>3/27/2016</a:t>
+              <a:t>3/28/2016</a:t>
             </a:fld>
             <a:endParaRPr lang="en-US" dirty="0"/>
           </a:p>
@@ -851,7 +855,7 @@
           <a:p>
             <a:fld id="{2076456F-F47D-4F25-8053-2A695DA0CA7D}" type="datetimeFigureOut">
               <a:rPr lang="en-US" dirty="0"/>
-              <a:t>3/27/2016</a:t>
+              <a:t>3/28/2016</a:t>
             </a:fld>
             <a:endParaRPr lang="en-US" dirty="0"/>
           </a:p>
@@ -1135,7 +1139,7 @@
           <a:p>
             <a:fld id="{5D6C7379-69CC-4837-9905-BEBA22830C8A}" type="datetimeFigureOut">
               <a:rPr lang="en-US" dirty="0"/>
-              <a:t>3/27/2016</a:t>
+              <a:t>3/28/2016</a:t>
             </a:fld>
             <a:endParaRPr lang="en-US" dirty="0"/>
           </a:p>
@@ -1584,7 +1588,7 @@
           <a:p>
             <a:fld id="{49EB8B7E-8AEE-4F10-BFEE-C999AD004D36}" type="datetimeFigureOut">
               <a:rPr lang="en-US" dirty="0"/>
-              <a:t>3/27/2016</a:t>
+              <a:t>3/28/2016</a:t>
             </a:fld>
             <a:endParaRPr lang="en-US" dirty="0"/>
           </a:p>
@@ -2153,7 +2157,7 @@
           <a:p>
             <a:fld id="{8668F3F9-58BC-440B-B37B-805B9055EF92}" type="datetimeFigureOut">
               <a:rPr lang="en-US" dirty="0"/>
-              <a:t>3/27/2016</a:t>
+              <a:t>3/28/2016</a:t>
             </a:fld>
             <a:endParaRPr lang="en-US" dirty="0"/>
           </a:p>
@@ -3007,7 +3011,7 @@
           <a:p>
             <a:fld id="{0D5A53AF-48EA-489D-8260-9DCAB666386A}" type="datetimeFigureOut">
               <a:rPr lang="en-US" dirty="0"/>
-              <a:t>3/27/2016</a:t>
+              <a:t>3/28/2016</a:t>
             </a:fld>
             <a:endParaRPr lang="en-US" dirty="0"/>
           </a:p>
@@ -3200,7 +3204,7 @@
           <a:p>
             <a:fld id="{0DED02AE-B9A4-47BD-AF8E-97E16144138B}" type="datetimeFigureOut">
               <a:rPr lang="en-US" dirty="0"/>
-              <a:t>3/27/2016</a:t>
+              <a:t>3/28/2016</a:t>
             </a:fld>
             <a:endParaRPr lang="en-US" dirty="0"/>
           </a:p>
@@ -3403,7 +3407,7 @@
           <a:p>
             <a:fld id="{CF0FD78B-DB02-4362-BCDC-98A55456977C}" type="datetimeFigureOut">
               <a:rPr lang="en-US" dirty="0"/>
-              <a:t>3/27/2016</a:t>
+              <a:t>3/28/2016</a:t>
             </a:fld>
             <a:endParaRPr lang="en-US" dirty="0"/>
           </a:p>
@@ -3656,7 +3660,7 @@
           <a:p>
             <a:fld id="{99916976-5D93-46E4-A98A-FAD63E4D0EA8}" type="datetimeFigureOut">
               <a:rPr lang="en-US" dirty="0"/>
-              <a:t>3/27/2016</a:t>
+              <a:t>3/28/2016</a:t>
             </a:fld>
             <a:endParaRPr lang="en-US" dirty="0"/>
           </a:p>
@@ -3943,7 +3947,7 @@
           <a:p>
             <a:fld id="{0F39F4F5-F4D2-4D2A-AB60-88D37ADCB869}" type="datetimeFigureOut">
               <a:rPr lang="en-US" dirty="0"/>
-              <a:t>3/27/2016</a:t>
+              <a:t>3/28/2016</a:t>
             </a:fld>
             <a:endParaRPr lang="en-US" dirty="0"/>
           </a:p>
@@ -4205,7 +4209,7 @@
           <a:p>
             <a:fld id="{D23BC6CE-6D1E-47E5-8859-F31AC5380EB2}" type="datetimeFigureOut">
               <a:rPr lang="en-US" dirty="0"/>
-              <a:t>3/27/2016</a:t>
+              <a:t>3/28/2016</a:t>
             </a:fld>
             <a:endParaRPr lang="en-US" dirty="0"/>
           </a:p>
@@ -4621,7 +4625,7 @@
           <a:p>
             <a:fld id="{B1B4E7C4-4DA4-404D-9965-B13F2DD7D8BF}" type="datetimeFigureOut">
               <a:rPr lang="en-US" dirty="0"/>
-              <a:t>3/27/2016</a:t>
+              <a:t>3/28/2016</a:t>
             </a:fld>
             <a:endParaRPr lang="en-US" dirty="0"/>
           </a:p>
@@ -4762,7 +4766,7 @@
           <a:p>
             <a:fld id="{476FB7AA-4A53-424F-AD41-70827B6504BA}" type="datetimeFigureOut">
               <a:rPr lang="en-US" dirty="0"/>
-              <a:t>3/27/2016</a:t>
+              <a:t>3/28/2016</a:t>
             </a:fld>
             <a:endParaRPr lang="en-US" dirty="0"/>
           </a:p>
@@ -4880,7 +4884,7 @@
           <a:p>
             <a:fld id="{E7884882-FB12-4BC8-9960-9AD8104D7FAE}" type="datetimeFigureOut">
               <a:rPr lang="en-US" dirty="0"/>
-              <a:t>3/27/2016</a:t>
+              <a:t>3/28/2016</a:t>
             </a:fld>
             <a:endParaRPr lang="en-US" dirty="0"/>
           </a:p>
@@ -5176,7 +5180,7 @@
           <a:p>
             <a:fld id="{F7D1BD23-6E54-4D9D-AD88-A2813C73CC25}" type="datetimeFigureOut">
               <a:rPr lang="en-US" dirty="0"/>
-              <a:t>3/27/2016</a:t>
+              <a:t>3/28/2016</a:t>
             </a:fld>
             <a:endParaRPr lang="en-US" dirty="0"/>
           </a:p>
@@ -5480,7 +5484,7 @@
           <a:p>
             <a:fld id="{1471A834-4F3C-4AF9-9C74-05EC35A0F292}" type="datetimeFigureOut">
               <a:rPr lang="en-US" dirty="0"/>
-              <a:t>3/27/2016</a:t>
+              <a:t>3/28/2016</a:t>
             </a:fld>
             <a:endParaRPr lang="en-US" dirty="0"/>
           </a:p>
@@ -6964,6 +6968,2131 @@
       </p:grpSpPr>
       <p:sp>
         <p:nvSpPr>
+          <p:cNvPr id="4" name="Заголовок 1"/>
+          <p:cNvSpPr txBox="1">
+            <a:spLocks/>
+          </p:cNvSpPr>
+          <p:nvPr/>
+        </p:nvSpPr>
+        <p:spPr>
+          <a:xfrm>
+            <a:off x="1700148" y="784296"/>
+            <a:ext cx="9144000" cy="873244"/>
+          </a:xfrm>
+          <a:prstGeom prst="rect">
+            <a:avLst/>
+          </a:prstGeom>
+        </p:spPr>
+        <p:txBody>
+          <a:bodyPr vert="horz" lIns="91440" tIns="45720" rIns="91440" bIns="45720" rtlCol="0" anchor="ctr">
+            <a:normAutofit/>
+          </a:bodyPr>
+          <a:lstStyle>
+            <a:lvl1pPr algn="l" defTabSz="914400" rtl="0" eaLnBrk="1" latinLnBrk="0" hangingPunct="1">
+              <a:lnSpc>
+                <a:spcPct val="90000"/>
+              </a:lnSpc>
+              <a:spcBef>
+                <a:spcPct val="0"/>
+              </a:spcBef>
+              <a:buNone/>
+              <a:defRPr sz="5400" b="0" kern="1200">
+                <a:gradFill flip="none" rotWithShape="1">
+                  <a:gsLst>
+                    <a:gs pos="28000">
+                      <a:schemeClr val="tx1">
+                        <a:lumMod val="93000"/>
+                      </a:schemeClr>
+                    </a:gs>
+                    <a:gs pos="0">
+                      <a:schemeClr val="bg1">
+                        <a:lumMod val="25000"/>
+                        <a:lumOff val="75000"/>
+                      </a:schemeClr>
+                    </a:gs>
+                    <a:gs pos="100000">
+                      <a:schemeClr val="tx2">
+                        <a:lumMod val="0"/>
+                        <a:lumOff val="100000"/>
+                      </a:schemeClr>
+                    </a:gs>
+                  </a:gsLst>
+                  <a:lin ang="4800000" scaled="0"/>
+                  <a:tileRect/>
+                </a:gradFill>
+                <a:latin typeface="+mj-lt"/>
+                <a:ea typeface="+mj-ea"/>
+                <a:cs typeface="+mj-cs"/>
+              </a:defRPr>
+            </a:lvl1pPr>
+          </a:lstStyle>
+          <a:p>
+            <a:pPr algn="ctr"/>
+            <a:r>
+              <a:rPr lang="ru-RU" sz="4400" dirty="0" smtClean="0">
+                <a:solidFill>
+                  <a:srgbClr val="FFFF00"/>
+                </a:solidFill>
+              </a:rPr>
+              <a:t>Введение</a:t>
+            </a:r>
+            <a:endParaRPr lang="en-US" sz="4400" dirty="0">
+              <a:solidFill>
+                <a:srgbClr val="FFFF00"/>
+              </a:solidFill>
+            </a:endParaRPr>
+          </a:p>
+        </p:txBody>
+      </p:sp>
+      <p:sp>
+        <p:nvSpPr>
+          <p:cNvPr id="5" name="TextBox 4"/>
+          <p:cNvSpPr txBox="1"/>
+          <p:nvPr/>
+        </p:nvSpPr>
+        <p:spPr>
+          <a:xfrm>
+            <a:off x="1009933" y="1787856"/>
+            <a:ext cx="8666090" cy="1384995"/>
+          </a:xfrm>
+          <a:prstGeom prst="rect">
+            <a:avLst/>
+          </a:prstGeom>
+          <a:noFill/>
+        </p:spPr>
+        <p:txBody>
+          <a:bodyPr wrap="none" rtlCol="0">
+            <a:spAutoFit/>
+          </a:bodyPr>
+          <a:lstStyle/>
+          <a:p>
+            <a:r>
+              <a:rPr lang="en-US" sz="2800" dirty="0" smtClean="0">
+                <a:solidFill>
+                  <a:srgbClr val="FFFF00"/>
+                </a:solidFill>
+              </a:rPr>
+              <a:t>STB </a:t>
+            </a:r>
+            <a:r>
+              <a:rPr lang="ru-RU" sz="2800" dirty="0" smtClean="0">
+                <a:solidFill>
+                  <a:srgbClr val="FFFF00"/>
+                </a:solidFill>
+              </a:rPr>
+              <a:t>(</a:t>
+            </a:r>
+            <a:r>
+              <a:rPr lang="en-US" sz="2800" dirty="0" smtClean="0">
+                <a:solidFill>
+                  <a:srgbClr val="FFFF00"/>
+                </a:solidFill>
+              </a:rPr>
+              <a:t>Set </a:t>
+            </a:r>
+            <a:r>
+              <a:rPr lang="en-US" sz="2800" dirty="0">
+                <a:solidFill>
+                  <a:srgbClr val="FFFF00"/>
+                </a:solidFill>
+              </a:rPr>
+              <a:t>top </a:t>
+            </a:r>
+            <a:r>
+              <a:rPr lang="en-US" sz="2800" dirty="0" smtClean="0">
+                <a:solidFill>
+                  <a:srgbClr val="FFFF00"/>
+                </a:solidFill>
+              </a:rPr>
+              <a:t>box</a:t>
+            </a:r>
+            <a:r>
+              <a:rPr lang="ru-RU" sz="2800" dirty="0" smtClean="0">
+                <a:solidFill>
+                  <a:srgbClr val="FFFF00"/>
+                </a:solidFill>
+              </a:rPr>
+              <a:t>) – приставка для просмотра </a:t>
+            </a:r>
+            <a:r>
+              <a:rPr lang="en-US" sz="2800" dirty="0" smtClean="0">
+                <a:solidFill>
+                  <a:srgbClr val="FFFF00"/>
+                </a:solidFill>
+              </a:rPr>
+              <a:t>IPTV</a:t>
+            </a:r>
+          </a:p>
+          <a:p>
+            <a:r>
+              <a:rPr lang="ru-RU" sz="2800" dirty="0" smtClean="0">
+                <a:solidFill>
+                  <a:srgbClr val="FFFF00"/>
+                </a:solidFill>
+              </a:rPr>
+              <a:t>Коллектор – сервер сбора первичной статистики с </a:t>
+            </a:r>
+            <a:r>
+              <a:rPr lang="en-US" sz="2800" dirty="0" smtClean="0">
+                <a:solidFill>
+                  <a:srgbClr val="FFFF00"/>
+                </a:solidFill>
+              </a:rPr>
+              <a:t>STB</a:t>
+            </a:r>
+            <a:endParaRPr lang="en-US" sz="2800" dirty="0">
+              <a:solidFill>
+                <a:srgbClr val="FFFF00"/>
+              </a:solidFill>
+            </a:endParaRPr>
+          </a:p>
+          <a:p>
+            <a:pPr marL="285750" indent="-285750">
+              <a:buFont typeface="Arial" panose="020B0604020202020204" pitchFamily="34" charset="0"/>
+              <a:buChar char="•"/>
+            </a:pPr>
+            <a:endParaRPr lang="ru-RU" sz="2800" dirty="0">
+              <a:solidFill>
+                <a:srgbClr val="FFFF00"/>
+              </a:solidFill>
+            </a:endParaRPr>
+          </a:p>
+        </p:txBody>
+      </p:sp>
+      <mc:AlternateContent xmlns:mc="http://schemas.openxmlformats.org/markup-compatibility/2006">
+        <mc:Choice xmlns:a14="http://schemas.microsoft.com/office/drawing/2010/main" Requires="a14">
+          <p:sp>
+            <p:nvSpPr>
+              <p:cNvPr id="7" name="Скругленный прямоугольник 6"/>
+              <p:cNvSpPr/>
+              <p:nvPr/>
+            </p:nvSpPr>
+            <p:spPr>
+              <a:xfrm>
+                <a:off x="1896222" y="2838481"/>
+                <a:ext cx="1460310" cy="668740"/>
+              </a:xfrm>
+              <a:prstGeom prst="roundRect">
+                <a:avLst/>
+              </a:prstGeom>
+            </p:spPr>
+            <p:style>
+              <a:lnRef idx="2">
+                <a:schemeClr val="accent1">
+                  <a:shade val="50000"/>
+                </a:schemeClr>
+              </a:lnRef>
+              <a:fillRef idx="1">
+                <a:schemeClr val="accent1"/>
+              </a:fillRef>
+              <a:effectRef idx="0">
+                <a:schemeClr val="accent1"/>
+              </a:effectRef>
+              <a:fontRef idx="minor">
+                <a:schemeClr val="lt1"/>
+              </a:fontRef>
+            </p:style>
+            <p:txBody>
+              <a:bodyPr rtlCol="0" anchor="ctr"/>
+              <a:lstStyle/>
+              <a:p>
+                <a:pPr algn="ctr"/>
+                <a14:m>
+                  <m:oMathPara xmlns:m="http://schemas.openxmlformats.org/officeDocument/2006/math">
+                    <m:oMathParaPr>
+                      <m:jc m:val="centerGroup"/>
+                    </m:oMathParaPr>
+                    <m:oMath xmlns:m="http://schemas.openxmlformats.org/officeDocument/2006/math">
+                      <m:sSub>
+                        <m:sSubPr>
+                          <m:ctrlPr>
+                            <a:rPr lang="en-US" b="1" i="1" dirty="0" smtClean="0">
+                              <a:solidFill>
+                                <a:srgbClr val="FFFF00"/>
+                              </a:solidFill>
+                              <a:latin typeface="Cambria Math" panose="02040503050406030204" pitchFamily="18" charset="0"/>
+                            </a:rPr>
+                          </m:ctrlPr>
+                        </m:sSubPr>
+                        <m:e>
+                          <m:r>
+                            <a:rPr lang="en-US" b="1" i="1" dirty="0" smtClean="0">
+                              <a:solidFill>
+                                <a:srgbClr val="FFFF00"/>
+                              </a:solidFill>
+                              <a:latin typeface="Cambria Math" panose="02040503050406030204" pitchFamily="18" charset="0"/>
+                            </a:rPr>
+                            <m:t>𝑺𝑻𝑩</m:t>
+                          </m:r>
+                        </m:e>
+                        <m:sub>
+                          <m:r>
+                            <a:rPr lang="en-US" b="1" i="1" dirty="0" smtClean="0">
+                              <a:solidFill>
+                                <a:srgbClr val="FFFF00"/>
+                              </a:solidFill>
+                              <a:latin typeface="Cambria Math" panose="02040503050406030204" pitchFamily="18" charset="0"/>
+                            </a:rPr>
+                            <m:t>𝟏</m:t>
+                          </m:r>
+                        </m:sub>
+                      </m:sSub>
+                    </m:oMath>
+                  </m:oMathPara>
+                </a14:m>
+                <a:endParaRPr lang="ru-RU" b="1" dirty="0"/>
+              </a:p>
+            </p:txBody>
+          </p:sp>
+        </mc:Choice>
+        <mc:Fallback>
+          <p:sp>
+            <p:nvSpPr>
+              <p:cNvPr id="7" name="Скругленный прямоугольник 6"/>
+              <p:cNvSpPr>
+                <a:spLocks noRot="1" noChangeAspect="1" noMove="1" noResize="1" noEditPoints="1" noAdjustHandles="1" noChangeArrowheads="1" noChangeShapeType="1" noTextEdit="1"/>
+              </p:cNvSpPr>
+              <p:nvPr/>
+            </p:nvSpPr>
+            <p:spPr>
+              <a:xfrm>
+                <a:off x="1896222" y="2838481"/>
+                <a:ext cx="1460310" cy="668740"/>
+              </a:xfrm>
+              <a:prstGeom prst="roundRect">
+                <a:avLst/>
+              </a:prstGeom>
+              <a:blipFill rotWithShape="0">
+                <a:blip r:embed="rId2"/>
+                <a:stretch>
+                  <a:fillRect/>
+                </a:stretch>
+              </a:blipFill>
+            </p:spPr>
+            <p:txBody>
+              <a:bodyPr/>
+              <a:lstStyle/>
+              <a:p>
+                <a:r>
+                  <a:rPr lang="ru-RU">
+                    <a:noFill/>
+                  </a:rPr>
+                  <a:t> </a:t>
+                </a:r>
+              </a:p>
+            </p:txBody>
+          </p:sp>
+        </mc:Fallback>
+      </mc:AlternateContent>
+      <mc:AlternateContent xmlns:mc="http://schemas.openxmlformats.org/markup-compatibility/2006">
+        <mc:Choice xmlns:a14="http://schemas.microsoft.com/office/drawing/2010/main" Requires="a14">
+          <p:sp>
+            <p:nvSpPr>
+              <p:cNvPr id="8" name="Скругленный прямоугольник 7"/>
+              <p:cNvSpPr/>
+              <p:nvPr/>
+            </p:nvSpPr>
+            <p:spPr>
+              <a:xfrm>
+                <a:off x="3978546" y="2838481"/>
+                <a:ext cx="1460310" cy="668740"/>
+              </a:xfrm>
+              <a:prstGeom prst="roundRect">
+                <a:avLst/>
+              </a:prstGeom>
+            </p:spPr>
+            <p:style>
+              <a:lnRef idx="2">
+                <a:schemeClr val="accent1">
+                  <a:shade val="50000"/>
+                </a:schemeClr>
+              </a:lnRef>
+              <a:fillRef idx="1">
+                <a:schemeClr val="accent1"/>
+              </a:fillRef>
+              <a:effectRef idx="0">
+                <a:schemeClr val="accent1"/>
+              </a:effectRef>
+              <a:fontRef idx="minor">
+                <a:schemeClr val="lt1"/>
+              </a:fontRef>
+            </p:style>
+            <p:txBody>
+              <a:bodyPr rtlCol="0" anchor="ctr"/>
+              <a:lstStyle/>
+              <a:p>
+                <a:pPr algn="ctr"/>
+                <a14:m>
+                  <m:oMathPara xmlns:m="http://schemas.openxmlformats.org/officeDocument/2006/math">
+                    <m:oMathParaPr>
+                      <m:jc m:val="centerGroup"/>
+                    </m:oMathParaPr>
+                    <m:oMath xmlns:m="http://schemas.openxmlformats.org/officeDocument/2006/math">
+                      <m:sSub>
+                        <m:sSubPr>
+                          <m:ctrlPr>
+                            <a:rPr lang="en-US" b="1" i="1" dirty="0" smtClean="0">
+                              <a:solidFill>
+                                <a:srgbClr val="FFFF00"/>
+                              </a:solidFill>
+                              <a:latin typeface="Cambria Math" panose="02040503050406030204" pitchFamily="18" charset="0"/>
+                            </a:rPr>
+                          </m:ctrlPr>
+                        </m:sSubPr>
+                        <m:e>
+                          <m:r>
+                            <a:rPr lang="en-US" b="1" i="1" dirty="0" smtClean="0">
+                              <a:solidFill>
+                                <a:srgbClr val="FFFF00"/>
+                              </a:solidFill>
+                              <a:latin typeface="Cambria Math" panose="02040503050406030204" pitchFamily="18" charset="0"/>
+                            </a:rPr>
+                            <m:t>𝑺𝑻𝑩</m:t>
+                          </m:r>
+                        </m:e>
+                        <m:sub>
+                          <m:r>
+                            <a:rPr lang="en-US" b="1" i="1" dirty="0" smtClean="0">
+                              <a:solidFill>
+                                <a:srgbClr val="FFFF00"/>
+                              </a:solidFill>
+                              <a:latin typeface="Cambria Math" panose="02040503050406030204" pitchFamily="18" charset="0"/>
+                            </a:rPr>
+                            <m:t>𝟐</m:t>
+                          </m:r>
+                        </m:sub>
+                      </m:sSub>
+                    </m:oMath>
+                  </m:oMathPara>
+                </a14:m>
+                <a:endParaRPr lang="ru-RU" b="1" dirty="0">
+                  <a:solidFill>
+                    <a:srgbClr val="FFFF00"/>
+                  </a:solidFill>
+                </a:endParaRPr>
+              </a:p>
+            </p:txBody>
+          </p:sp>
+        </mc:Choice>
+        <mc:Fallback>
+          <p:sp>
+            <p:nvSpPr>
+              <p:cNvPr id="8" name="Скругленный прямоугольник 7"/>
+              <p:cNvSpPr>
+                <a:spLocks noRot="1" noChangeAspect="1" noMove="1" noResize="1" noEditPoints="1" noAdjustHandles="1" noChangeArrowheads="1" noChangeShapeType="1" noTextEdit="1"/>
+              </p:cNvSpPr>
+              <p:nvPr/>
+            </p:nvSpPr>
+            <p:spPr>
+              <a:xfrm>
+                <a:off x="3978546" y="2838481"/>
+                <a:ext cx="1460310" cy="668740"/>
+              </a:xfrm>
+              <a:prstGeom prst="roundRect">
+                <a:avLst/>
+              </a:prstGeom>
+              <a:blipFill rotWithShape="0">
+                <a:blip r:embed="rId3"/>
+                <a:stretch>
+                  <a:fillRect/>
+                </a:stretch>
+              </a:blipFill>
+            </p:spPr>
+            <p:txBody>
+              <a:bodyPr/>
+              <a:lstStyle/>
+              <a:p>
+                <a:r>
+                  <a:rPr lang="ru-RU">
+                    <a:noFill/>
+                  </a:rPr>
+                  <a:t> </a:t>
+                </a:r>
+              </a:p>
+            </p:txBody>
+          </p:sp>
+        </mc:Fallback>
+      </mc:AlternateContent>
+      <mc:AlternateContent xmlns:mc="http://schemas.openxmlformats.org/markup-compatibility/2006">
+        <mc:Choice xmlns:a14="http://schemas.microsoft.com/office/drawing/2010/main" Requires="a14">
+          <p:sp>
+            <p:nvSpPr>
+              <p:cNvPr id="9" name="Скругленный прямоугольник 8"/>
+              <p:cNvSpPr/>
+              <p:nvPr/>
+            </p:nvSpPr>
+            <p:spPr>
+              <a:xfrm>
+                <a:off x="8449227" y="2838481"/>
+                <a:ext cx="1460310" cy="668740"/>
+              </a:xfrm>
+              <a:prstGeom prst="roundRect">
+                <a:avLst/>
+              </a:prstGeom>
+            </p:spPr>
+            <p:style>
+              <a:lnRef idx="2">
+                <a:schemeClr val="accent1">
+                  <a:shade val="50000"/>
+                </a:schemeClr>
+              </a:lnRef>
+              <a:fillRef idx="1">
+                <a:schemeClr val="accent1"/>
+              </a:fillRef>
+              <a:effectRef idx="0">
+                <a:schemeClr val="accent1"/>
+              </a:effectRef>
+              <a:fontRef idx="minor">
+                <a:schemeClr val="lt1"/>
+              </a:fontRef>
+            </p:style>
+            <p:txBody>
+              <a:bodyPr rtlCol="0" anchor="ctr"/>
+              <a:lstStyle/>
+              <a:p>
+                <a:pPr algn="ctr"/>
+                <a14:m>
+                  <m:oMathPara xmlns:m="http://schemas.openxmlformats.org/officeDocument/2006/math">
+                    <m:oMathParaPr>
+                      <m:jc m:val="centerGroup"/>
+                    </m:oMathParaPr>
+                    <m:oMath xmlns:m="http://schemas.openxmlformats.org/officeDocument/2006/math">
+                      <m:sSub>
+                        <m:sSubPr>
+                          <m:ctrlPr>
+                            <a:rPr lang="en-US" b="1" i="1" dirty="0" smtClean="0">
+                              <a:solidFill>
+                                <a:srgbClr val="FFFF00"/>
+                              </a:solidFill>
+                              <a:latin typeface="Cambria Math" panose="02040503050406030204" pitchFamily="18" charset="0"/>
+                            </a:rPr>
+                          </m:ctrlPr>
+                        </m:sSubPr>
+                        <m:e>
+                          <m:r>
+                            <a:rPr lang="en-US" b="1" i="1" dirty="0" smtClean="0">
+                              <a:solidFill>
+                                <a:srgbClr val="FFFF00"/>
+                              </a:solidFill>
+                              <a:latin typeface="Cambria Math" panose="02040503050406030204" pitchFamily="18" charset="0"/>
+                            </a:rPr>
+                            <m:t>𝑺𝑻𝑩</m:t>
+                          </m:r>
+                        </m:e>
+                        <m:sub>
+                          <m:r>
+                            <a:rPr lang="en-US" b="1" i="1" dirty="0" smtClean="0">
+                              <a:solidFill>
+                                <a:srgbClr val="FFFF00"/>
+                              </a:solidFill>
+                              <a:latin typeface="Cambria Math" panose="02040503050406030204" pitchFamily="18" charset="0"/>
+                            </a:rPr>
+                            <m:t>𝒏</m:t>
+                          </m:r>
+                        </m:sub>
+                      </m:sSub>
+                    </m:oMath>
+                  </m:oMathPara>
+                </a14:m>
+                <a:endParaRPr lang="ru-RU" b="1" dirty="0"/>
+              </a:p>
+            </p:txBody>
+          </p:sp>
+        </mc:Choice>
+        <mc:Fallback>
+          <p:sp>
+            <p:nvSpPr>
+              <p:cNvPr id="9" name="Скругленный прямоугольник 8"/>
+              <p:cNvSpPr>
+                <a:spLocks noRot="1" noChangeAspect="1" noMove="1" noResize="1" noEditPoints="1" noAdjustHandles="1" noChangeArrowheads="1" noChangeShapeType="1" noTextEdit="1"/>
+              </p:cNvSpPr>
+              <p:nvPr/>
+            </p:nvSpPr>
+            <p:spPr>
+              <a:xfrm>
+                <a:off x="8449227" y="2838481"/>
+                <a:ext cx="1460310" cy="668740"/>
+              </a:xfrm>
+              <a:prstGeom prst="roundRect">
+                <a:avLst/>
+              </a:prstGeom>
+              <a:blipFill rotWithShape="0">
+                <a:blip r:embed="rId4"/>
+                <a:stretch>
+                  <a:fillRect/>
+                </a:stretch>
+              </a:blipFill>
+            </p:spPr>
+            <p:txBody>
+              <a:bodyPr/>
+              <a:lstStyle/>
+              <a:p>
+                <a:r>
+                  <a:rPr lang="ru-RU">
+                    <a:noFill/>
+                  </a:rPr>
+                  <a:t> </a:t>
+                </a:r>
+              </a:p>
+            </p:txBody>
+          </p:sp>
+        </mc:Fallback>
+      </mc:AlternateContent>
+      <p:sp>
+        <p:nvSpPr>
+          <p:cNvPr id="10" name="TextBox 9"/>
+          <p:cNvSpPr txBox="1"/>
+          <p:nvPr/>
+        </p:nvSpPr>
+        <p:spPr>
+          <a:xfrm>
+            <a:off x="6608052" y="2611158"/>
+            <a:ext cx="671979" cy="830997"/>
+          </a:xfrm>
+          <a:prstGeom prst="rect">
+            <a:avLst/>
+          </a:prstGeom>
+          <a:noFill/>
+        </p:spPr>
+        <p:txBody>
+          <a:bodyPr wrap="none" rtlCol="0">
+            <a:spAutoFit/>
+          </a:bodyPr>
+          <a:lstStyle/>
+          <a:p>
+            <a:r>
+              <a:rPr lang="en-US" sz="4800" dirty="0" smtClean="0">
+                <a:solidFill>
+                  <a:srgbClr val="FFFF00"/>
+                </a:solidFill>
+              </a:rPr>
+              <a:t>…</a:t>
+            </a:r>
+            <a:endParaRPr lang="ru-RU" sz="4800" dirty="0">
+              <a:solidFill>
+                <a:srgbClr val="FFFF00"/>
+              </a:solidFill>
+            </a:endParaRPr>
+          </a:p>
+        </p:txBody>
+      </p:sp>
+      <p:sp>
+        <p:nvSpPr>
+          <p:cNvPr id="11" name="Блок-схема: магнитный диск 10"/>
+          <p:cNvSpPr/>
+          <p:nvPr/>
+        </p:nvSpPr>
+        <p:spPr>
+          <a:xfrm>
+            <a:off x="5024834" y="4208086"/>
+            <a:ext cx="2276708" cy="1555845"/>
+          </a:xfrm>
+          <a:prstGeom prst="flowChartMagneticDisk">
+            <a:avLst/>
+          </a:prstGeom>
+        </p:spPr>
+        <p:style>
+          <a:lnRef idx="2">
+            <a:schemeClr val="accent1">
+              <a:shade val="50000"/>
+            </a:schemeClr>
+          </a:lnRef>
+          <a:fillRef idx="1">
+            <a:schemeClr val="accent1"/>
+          </a:fillRef>
+          <a:effectRef idx="0">
+            <a:schemeClr val="accent1"/>
+          </a:effectRef>
+          <a:fontRef idx="minor">
+            <a:schemeClr val="lt1"/>
+          </a:fontRef>
+        </p:style>
+        <p:txBody>
+          <a:bodyPr rtlCol="0" anchor="ctr"/>
+          <a:lstStyle/>
+          <a:p>
+            <a:pPr algn="ctr"/>
+            <a:r>
+              <a:rPr lang="ru-RU" b="1" dirty="0" smtClean="0">
+                <a:solidFill>
+                  <a:srgbClr val="FFFF00"/>
+                </a:solidFill>
+              </a:rPr>
+              <a:t>Коллектор</a:t>
+            </a:r>
+            <a:endParaRPr lang="ru-RU" b="1" dirty="0">
+              <a:solidFill>
+                <a:srgbClr val="FFFF00"/>
+              </a:solidFill>
+            </a:endParaRPr>
+          </a:p>
+        </p:txBody>
+      </p:sp>
+      <p:sp>
+        <p:nvSpPr>
+          <p:cNvPr id="12" name="Блок-схема: несколько документов 11"/>
+          <p:cNvSpPr/>
+          <p:nvPr/>
+        </p:nvSpPr>
+        <p:spPr>
+          <a:xfrm>
+            <a:off x="6749679" y="5235379"/>
+            <a:ext cx="1060704" cy="758952"/>
+          </a:xfrm>
+          <a:prstGeom prst="flowChartMultidocument">
+            <a:avLst/>
+          </a:prstGeom>
+        </p:spPr>
+        <p:style>
+          <a:lnRef idx="2">
+            <a:schemeClr val="accent1">
+              <a:shade val="50000"/>
+            </a:schemeClr>
+          </a:lnRef>
+          <a:fillRef idx="1">
+            <a:schemeClr val="accent1"/>
+          </a:fillRef>
+          <a:effectRef idx="0">
+            <a:schemeClr val="accent1"/>
+          </a:effectRef>
+          <a:fontRef idx="minor">
+            <a:schemeClr val="lt1"/>
+          </a:fontRef>
+        </p:style>
+        <p:txBody>
+          <a:bodyPr rtlCol="0" anchor="ctr"/>
+          <a:lstStyle/>
+          <a:p>
+            <a:pPr algn="ctr"/>
+            <a:r>
+              <a:rPr lang="en-US" b="1" dirty="0" smtClean="0">
+                <a:solidFill>
+                  <a:srgbClr val="FFFF00"/>
+                </a:solidFill>
+              </a:rPr>
+              <a:t>.csv</a:t>
+            </a:r>
+            <a:endParaRPr lang="ru-RU" b="1" dirty="0">
+              <a:solidFill>
+                <a:srgbClr val="FFFF00"/>
+              </a:solidFill>
+            </a:endParaRPr>
+          </a:p>
+        </p:txBody>
+      </p:sp>
+      <p:cxnSp>
+        <p:nvCxnSpPr>
+          <p:cNvPr id="14" name="Прямая со стрелкой 13"/>
+          <p:cNvCxnSpPr/>
+          <p:nvPr/>
+        </p:nvCxnSpPr>
+        <p:spPr>
+          <a:xfrm>
+            <a:off x="2843739" y="3611295"/>
+            <a:ext cx="2074459" cy="1132764"/>
+          </a:xfrm>
+          <a:prstGeom prst="straightConnector1">
+            <a:avLst/>
+          </a:prstGeom>
+          <a:ln>
+            <a:solidFill>
+              <a:srgbClr val="FFFF00"/>
+            </a:solidFill>
+            <a:tailEnd type="triangle"/>
+          </a:ln>
+        </p:spPr>
+        <p:style>
+          <a:lnRef idx="1">
+            <a:schemeClr val="accent1"/>
+          </a:lnRef>
+          <a:fillRef idx="0">
+            <a:schemeClr val="accent1"/>
+          </a:fillRef>
+          <a:effectRef idx="0">
+            <a:schemeClr val="accent1"/>
+          </a:effectRef>
+          <a:fontRef idx="minor">
+            <a:schemeClr val="tx1"/>
+          </a:fontRef>
+        </p:style>
+      </p:cxnSp>
+      <p:cxnSp>
+        <p:nvCxnSpPr>
+          <p:cNvPr id="16" name="Прямая со стрелкой 15"/>
+          <p:cNvCxnSpPr/>
+          <p:nvPr/>
+        </p:nvCxnSpPr>
+        <p:spPr>
+          <a:xfrm>
+            <a:off x="5024834" y="3535614"/>
+            <a:ext cx="414022" cy="672472"/>
+          </a:xfrm>
+          <a:prstGeom prst="straightConnector1">
+            <a:avLst/>
+          </a:prstGeom>
+          <a:ln>
+            <a:solidFill>
+              <a:srgbClr val="FFFF00"/>
+            </a:solidFill>
+            <a:tailEnd type="triangle"/>
+          </a:ln>
+        </p:spPr>
+        <p:style>
+          <a:lnRef idx="1">
+            <a:schemeClr val="accent1"/>
+          </a:lnRef>
+          <a:fillRef idx="0">
+            <a:schemeClr val="accent1"/>
+          </a:fillRef>
+          <a:effectRef idx="0">
+            <a:schemeClr val="accent1"/>
+          </a:effectRef>
+          <a:fontRef idx="minor">
+            <a:schemeClr val="tx1"/>
+          </a:fontRef>
+        </p:style>
+      </p:cxnSp>
+      <p:cxnSp>
+        <p:nvCxnSpPr>
+          <p:cNvPr id="19" name="Прямая со стрелкой 18"/>
+          <p:cNvCxnSpPr/>
+          <p:nvPr/>
+        </p:nvCxnSpPr>
+        <p:spPr>
+          <a:xfrm flipH="1">
+            <a:off x="7408178" y="3611295"/>
+            <a:ext cx="1041049" cy="1132764"/>
+          </a:xfrm>
+          <a:prstGeom prst="straightConnector1">
+            <a:avLst/>
+          </a:prstGeom>
+          <a:ln>
+            <a:solidFill>
+              <a:srgbClr val="FFFF00"/>
+            </a:solidFill>
+            <a:tailEnd type="triangle"/>
+          </a:ln>
+        </p:spPr>
+        <p:style>
+          <a:lnRef idx="1">
+            <a:schemeClr val="accent1"/>
+          </a:lnRef>
+          <a:fillRef idx="0">
+            <a:schemeClr val="accent1"/>
+          </a:fillRef>
+          <a:effectRef idx="0">
+            <a:schemeClr val="accent1"/>
+          </a:effectRef>
+          <a:fontRef idx="minor">
+            <a:schemeClr val="tx1"/>
+          </a:fontRef>
+        </p:style>
+      </p:cxnSp>
+    </p:spTree>
+    <p:extLst>
+      <p:ext uri="{BB962C8B-B14F-4D97-AF65-F5344CB8AC3E}">
+        <p14:creationId xmlns:p14="http://schemas.microsoft.com/office/powerpoint/2010/main" val="2042915326"/>
+      </p:ext>
+    </p:extLst>
+  </p:cSld>
+  <p:clrMapOvr>
+    <a:masterClrMapping/>
+  </p:clrMapOvr>
+</p:sld>
+</file>
+
+<file path=ppt/slides/slide10.xml><?xml version="1.0" encoding="utf-8"?>
+<p:sld xmlns:a="http://schemas.openxmlformats.org/drawingml/2006/main" xmlns:r="http://schemas.openxmlformats.org/officeDocument/2006/relationships" xmlns:p="http://schemas.openxmlformats.org/presentationml/2006/main">
+  <p:cSld>
+    <p:spTree>
+      <p:nvGrpSpPr>
+        <p:cNvPr id="1" name=""/>
+        <p:cNvGrpSpPr/>
+        <p:nvPr/>
+      </p:nvGrpSpPr>
+      <p:grpSpPr>
+        <a:xfrm>
+          <a:off x="0" y="0"/>
+          <a:ext cx="0" cy="0"/>
+          <a:chOff x="0" y="0"/>
+          <a:chExt cx="0" cy="0"/>
+        </a:xfrm>
+      </p:grpSpPr>
+      <p:sp>
+        <p:nvSpPr>
+          <p:cNvPr id="3" name="Подзаголовок 2"/>
+          <p:cNvSpPr>
+            <a:spLocks noGrp="1"/>
+          </p:cNvSpPr>
+          <p:nvPr>
+            <p:ph type="subTitle" idx="1"/>
+          </p:nvPr>
+        </p:nvSpPr>
+        <p:spPr>
+          <a:xfrm>
+            <a:off x="1418229" y="705515"/>
+            <a:ext cx="9144000" cy="754025"/>
+          </a:xfrm>
+        </p:spPr>
+        <p:txBody>
+          <a:bodyPr>
+            <a:normAutofit/>
+          </a:bodyPr>
+          <a:lstStyle/>
+          <a:p>
+            <a:pPr algn="ctr"/>
+            <a:r>
+              <a:rPr lang="en-US" sz="4400" dirty="0" smtClean="0">
+                <a:solidFill>
+                  <a:srgbClr val="FFFF00"/>
+                </a:solidFill>
+              </a:rPr>
+              <a:t>EM</a:t>
+            </a:r>
+            <a:r>
+              <a:rPr lang="ru-RU" sz="4400" dirty="0">
+                <a:solidFill>
+                  <a:srgbClr val="FFFF00"/>
+                </a:solidFill>
+              </a:rPr>
+              <a:t> </a:t>
+            </a:r>
+            <a:r>
+              <a:rPr lang="ru-RU" sz="4400" dirty="0" smtClean="0">
+                <a:solidFill>
+                  <a:srgbClr val="FFFF00"/>
+                </a:solidFill>
+              </a:rPr>
+              <a:t>алгоритм </a:t>
+            </a:r>
+            <a:endParaRPr lang="ru-RU" sz="4400" dirty="0">
+              <a:solidFill>
+                <a:srgbClr val="FFFF00"/>
+              </a:solidFill>
+            </a:endParaRPr>
+          </a:p>
+        </p:txBody>
+      </p:sp>
+      <p:sp>
+        <p:nvSpPr>
+          <p:cNvPr id="4" name="TextBox 3"/>
+          <p:cNvSpPr txBox="1"/>
+          <p:nvPr/>
+        </p:nvSpPr>
+        <p:spPr>
+          <a:xfrm>
+            <a:off x="668740" y="1459540"/>
+            <a:ext cx="2943434" cy="584775"/>
+          </a:xfrm>
+          <a:prstGeom prst="rect">
+            <a:avLst/>
+          </a:prstGeom>
+          <a:noFill/>
+        </p:spPr>
+        <p:txBody>
+          <a:bodyPr wrap="none" rtlCol="0">
+            <a:spAutoFit/>
+          </a:bodyPr>
+          <a:lstStyle/>
+          <a:p>
+            <a:r>
+              <a:rPr lang="ru-RU" sz="3200" dirty="0" smtClean="0">
+                <a:solidFill>
+                  <a:srgbClr val="FFFF00"/>
+                </a:solidFill>
+                <a:latin typeface="+mj-lt"/>
+              </a:rPr>
+              <a:t>Преимущества:</a:t>
+            </a:r>
+            <a:endParaRPr lang="ru-RU" sz="3200" dirty="0">
+              <a:solidFill>
+                <a:srgbClr val="FFFF00"/>
+              </a:solidFill>
+              <a:latin typeface="+mj-lt"/>
+            </a:endParaRPr>
+          </a:p>
+        </p:txBody>
+      </p:sp>
+      <p:sp>
+        <p:nvSpPr>
+          <p:cNvPr id="5" name="TextBox 4"/>
+          <p:cNvSpPr txBox="1"/>
+          <p:nvPr/>
+        </p:nvSpPr>
+        <p:spPr>
+          <a:xfrm>
+            <a:off x="1156282" y="2028899"/>
+            <a:ext cx="10129120" cy="2031325"/>
+          </a:xfrm>
+          <a:prstGeom prst="rect">
+            <a:avLst/>
+          </a:prstGeom>
+          <a:noFill/>
+        </p:spPr>
+        <p:txBody>
+          <a:bodyPr wrap="none" rtlCol="0">
+            <a:spAutoFit/>
+          </a:bodyPr>
+          <a:lstStyle/>
+          <a:p>
+            <a:pPr marL="285750" indent="-285750">
+              <a:buFont typeface="Arial" panose="020B0604020202020204" pitchFamily="34" charset="0"/>
+              <a:buChar char="•"/>
+            </a:pPr>
+            <a:r>
+              <a:rPr lang="ru-RU" dirty="0" smtClean="0">
+                <a:solidFill>
+                  <a:srgbClr val="FFFF00"/>
+                </a:solidFill>
+              </a:rPr>
+              <a:t>Алгоритм работает с неполными данными</a:t>
+            </a:r>
+          </a:p>
+          <a:p>
+            <a:pPr marL="285750" indent="-285750">
+              <a:buFont typeface="Arial" panose="020B0604020202020204" pitchFamily="34" charset="0"/>
+              <a:buChar char="•"/>
+            </a:pPr>
+            <a:r>
+              <a:rPr lang="ru-RU" dirty="0" smtClean="0">
+                <a:solidFill>
+                  <a:srgbClr val="FFFF00"/>
+                </a:solidFill>
+              </a:rPr>
+              <a:t>Можно явно задать некоторые параметры кластеров</a:t>
+            </a:r>
+          </a:p>
+          <a:p>
+            <a:pPr marL="285750" indent="-285750">
+              <a:buFont typeface="Arial" panose="020B0604020202020204" pitchFamily="34" charset="0"/>
+              <a:buChar char="•"/>
+            </a:pPr>
+            <a:r>
+              <a:rPr lang="ru-RU" dirty="0" smtClean="0">
+                <a:solidFill>
+                  <a:srgbClr val="FFFF00"/>
+                </a:solidFill>
+              </a:rPr>
+              <a:t>Работает с разнородными данными (номинальными, вещественными и т.д.)</a:t>
+            </a:r>
+          </a:p>
+          <a:p>
+            <a:pPr marL="285750" indent="-285750">
+              <a:buFont typeface="Arial" panose="020B0604020202020204" pitchFamily="34" charset="0"/>
+              <a:buChar char="•"/>
+            </a:pPr>
+            <a:r>
+              <a:rPr lang="ru-RU" dirty="0" smtClean="0">
+                <a:solidFill>
+                  <a:srgbClr val="FFFF00"/>
+                </a:solidFill>
+              </a:rPr>
+              <a:t>Из полученных плотностей можно генерировать семплы и эмулировать ими входные данные</a:t>
+            </a:r>
+          </a:p>
+          <a:p>
+            <a:r>
+              <a:rPr lang="ru-RU" dirty="0" smtClean="0">
+                <a:solidFill>
+                  <a:srgbClr val="FFFF00"/>
+                </a:solidFill>
+              </a:rPr>
+              <a:t>      (фактически можно проводить разностороннее тестирование системы)</a:t>
+            </a:r>
+          </a:p>
+          <a:p>
+            <a:pPr marL="285750" indent="-285750">
+              <a:buFont typeface="Arial" panose="020B0604020202020204" pitchFamily="34" charset="0"/>
+              <a:buChar char="•"/>
+            </a:pPr>
+            <a:r>
+              <a:rPr lang="ru-RU" dirty="0" smtClean="0">
+                <a:solidFill>
+                  <a:srgbClr val="FFFF00"/>
+                </a:solidFill>
+              </a:rPr>
+              <a:t>Сложность алгоритма </a:t>
+            </a:r>
+            <a:r>
+              <a:rPr lang="en-US" dirty="0" smtClean="0">
+                <a:solidFill>
+                  <a:srgbClr val="FFFF00"/>
+                </a:solidFill>
+              </a:rPr>
+              <a:t>O(</a:t>
+            </a:r>
+            <a:r>
+              <a:rPr lang="ru-RU" dirty="0" smtClean="0">
+                <a:solidFill>
+                  <a:srgbClr val="FFFF00"/>
+                </a:solidFill>
+              </a:rPr>
+              <a:t>С*</a:t>
+            </a:r>
+            <a:r>
+              <a:rPr lang="en-US" dirty="0" smtClean="0">
+                <a:solidFill>
+                  <a:srgbClr val="FFFF00"/>
+                </a:solidFill>
+              </a:rPr>
+              <a:t>S*N)</a:t>
+            </a:r>
+            <a:r>
+              <a:rPr lang="ru-RU" dirty="0" smtClean="0">
+                <a:solidFill>
+                  <a:srgbClr val="FFFF00"/>
+                </a:solidFill>
+              </a:rPr>
+              <a:t> – линейна по входным данным, а доработав формулы </a:t>
+            </a:r>
+            <a:r>
+              <a:rPr lang="en-US" dirty="0" smtClean="0">
+                <a:solidFill>
+                  <a:srgbClr val="FFFF00"/>
+                </a:solidFill>
+              </a:rPr>
+              <a:t>M</a:t>
+            </a:r>
+            <a:r>
+              <a:rPr lang="ru-RU" dirty="0" smtClean="0">
+                <a:solidFill>
+                  <a:srgbClr val="FFFF00"/>
+                </a:solidFill>
+              </a:rPr>
+              <a:t>-шага </a:t>
+            </a:r>
+          </a:p>
+          <a:p>
+            <a:r>
+              <a:rPr lang="ru-RU" dirty="0">
+                <a:solidFill>
+                  <a:srgbClr val="FFFF00"/>
+                </a:solidFill>
+              </a:rPr>
+              <a:t> </a:t>
+            </a:r>
+            <a:r>
+              <a:rPr lang="ru-RU" dirty="0" smtClean="0">
+                <a:solidFill>
+                  <a:srgbClr val="FFFF00"/>
+                </a:solidFill>
+              </a:rPr>
+              <a:t>     до применения </a:t>
+            </a:r>
+            <a:r>
+              <a:rPr lang="en-US" dirty="0" smtClean="0">
+                <a:solidFill>
+                  <a:srgbClr val="FFFF00"/>
+                </a:solidFill>
+              </a:rPr>
+              <a:t> </a:t>
+            </a:r>
+            <a:r>
+              <a:rPr lang="ru-RU" dirty="0" smtClean="0">
+                <a:solidFill>
+                  <a:srgbClr val="FFFF00"/>
+                </a:solidFill>
+              </a:rPr>
+              <a:t>достаточных статистик – </a:t>
+            </a:r>
+            <a:r>
+              <a:rPr lang="en-US" dirty="0" smtClean="0">
+                <a:solidFill>
+                  <a:srgbClr val="FFFF00"/>
+                </a:solidFill>
+              </a:rPr>
+              <a:t>O(C*S*U)</a:t>
+            </a:r>
+            <a:endParaRPr lang="ru-RU" dirty="0">
+              <a:solidFill>
+                <a:srgbClr val="FFFF00"/>
+              </a:solidFill>
+            </a:endParaRPr>
+          </a:p>
+        </p:txBody>
+      </p:sp>
+      <p:sp>
+        <p:nvSpPr>
+          <p:cNvPr id="6" name="TextBox 5"/>
+          <p:cNvSpPr txBox="1"/>
+          <p:nvPr/>
+        </p:nvSpPr>
+        <p:spPr>
+          <a:xfrm>
+            <a:off x="668740" y="4158953"/>
+            <a:ext cx="2376997" cy="584775"/>
+          </a:xfrm>
+          <a:prstGeom prst="rect">
+            <a:avLst/>
+          </a:prstGeom>
+          <a:noFill/>
+        </p:spPr>
+        <p:txBody>
+          <a:bodyPr wrap="none" rtlCol="0">
+            <a:spAutoFit/>
+          </a:bodyPr>
+          <a:lstStyle/>
+          <a:p>
+            <a:r>
+              <a:rPr lang="ru-RU" sz="3200" dirty="0" smtClean="0">
+                <a:solidFill>
+                  <a:srgbClr val="FFFF00"/>
+                </a:solidFill>
+                <a:latin typeface="+mj-lt"/>
+              </a:rPr>
+              <a:t>Недостатки:</a:t>
+            </a:r>
+            <a:endParaRPr lang="ru-RU" sz="3200" dirty="0">
+              <a:solidFill>
+                <a:srgbClr val="FFFF00"/>
+              </a:solidFill>
+              <a:latin typeface="+mj-lt"/>
+            </a:endParaRPr>
+          </a:p>
+        </p:txBody>
+      </p:sp>
+      <p:sp>
+        <p:nvSpPr>
+          <p:cNvPr id="7" name="TextBox 6"/>
+          <p:cNvSpPr txBox="1"/>
+          <p:nvPr/>
+        </p:nvSpPr>
+        <p:spPr>
+          <a:xfrm>
+            <a:off x="1156282" y="4697534"/>
+            <a:ext cx="8990346" cy="1477328"/>
+          </a:xfrm>
+          <a:prstGeom prst="rect">
+            <a:avLst/>
+          </a:prstGeom>
+          <a:noFill/>
+        </p:spPr>
+        <p:txBody>
+          <a:bodyPr wrap="none" rtlCol="0">
+            <a:spAutoFit/>
+          </a:bodyPr>
+          <a:lstStyle/>
+          <a:p>
+            <a:pPr marL="285750" indent="-285750">
+              <a:buFont typeface="Arial" panose="020B0604020202020204" pitchFamily="34" charset="0"/>
+              <a:buChar char="•"/>
+            </a:pPr>
+            <a:r>
+              <a:rPr lang="ru-RU" dirty="0" smtClean="0">
+                <a:solidFill>
+                  <a:srgbClr val="FFFF00"/>
+                </a:solidFill>
+              </a:rPr>
+              <a:t>Переобучается на каждой итерации, но со временем эта ошибка уменьшается</a:t>
+            </a:r>
+          </a:p>
+          <a:p>
+            <a:pPr marL="285750" indent="-285750">
+              <a:buFont typeface="Arial" panose="020B0604020202020204" pitchFamily="34" charset="0"/>
+              <a:buChar char="•"/>
+            </a:pPr>
+            <a:r>
+              <a:rPr lang="ru-RU" dirty="0" smtClean="0">
+                <a:solidFill>
+                  <a:srgbClr val="FFFF00"/>
+                </a:solidFill>
+              </a:rPr>
+              <a:t>Находит ближайший локальный максимум, </a:t>
+            </a:r>
+            <a:r>
+              <a:rPr lang="ru-RU" dirty="0">
+                <a:solidFill>
+                  <a:srgbClr val="FFFF00"/>
+                </a:solidFill>
+              </a:rPr>
+              <a:t>н</a:t>
+            </a:r>
+            <a:r>
+              <a:rPr lang="ru-RU" dirty="0" smtClean="0">
+                <a:solidFill>
+                  <a:srgbClr val="FFFF00"/>
+                </a:solidFill>
+              </a:rPr>
+              <a:t>о </a:t>
+            </a:r>
+            <a:r>
+              <a:rPr lang="ru-RU" dirty="0">
+                <a:solidFill>
+                  <a:srgbClr val="FFFF00"/>
+                </a:solidFill>
+              </a:rPr>
+              <a:t>с</a:t>
+            </a:r>
+            <a:r>
+              <a:rPr lang="ru-RU" dirty="0" smtClean="0">
+                <a:solidFill>
+                  <a:srgbClr val="FFFF00"/>
+                </a:solidFill>
+              </a:rPr>
+              <a:t>о временем стремится к глобальному</a:t>
+            </a:r>
+          </a:p>
+          <a:p>
+            <a:pPr marL="285750" indent="-285750">
+              <a:buFont typeface="Arial" panose="020B0604020202020204" pitchFamily="34" charset="0"/>
+              <a:buChar char="•"/>
+            </a:pPr>
+            <a:r>
+              <a:rPr lang="ru-RU" dirty="0" smtClean="0">
+                <a:solidFill>
+                  <a:srgbClr val="FFFF00"/>
+                </a:solidFill>
+              </a:rPr>
+              <a:t>Требуемое кол-во кластеров задается как параметр, а не оценивается в процессе </a:t>
+            </a:r>
+          </a:p>
+          <a:p>
+            <a:pPr marL="285750" indent="-285750">
+              <a:buFont typeface="Arial" panose="020B0604020202020204" pitchFamily="34" charset="0"/>
+              <a:buChar char="•"/>
+            </a:pPr>
+            <a:r>
+              <a:rPr lang="ru-RU" dirty="0" smtClean="0">
+                <a:solidFill>
+                  <a:srgbClr val="FFFF00"/>
+                </a:solidFill>
+              </a:rPr>
+              <a:t>Используется наивный подход – значения в столбцах независимы</a:t>
+            </a:r>
+          </a:p>
+          <a:p>
+            <a:pPr marL="285750" indent="-285750">
+              <a:buFont typeface="Arial" panose="020B0604020202020204" pitchFamily="34" charset="0"/>
+              <a:buChar char="•"/>
+            </a:pPr>
+            <a:endParaRPr lang="ru-RU" dirty="0">
+              <a:solidFill>
+                <a:srgbClr val="FFFF00"/>
+              </a:solidFill>
+            </a:endParaRPr>
+          </a:p>
+        </p:txBody>
+      </p:sp>
+    </p:spTree>
+    <p:extLst>
+      <p:ext uri="{BB962C8B-B14F-4D97-AF65-F5344CB8AC3E}">
+        <p14:creationId xmlns:p14="http://schemas.microsoft.com/office/powerpoint/2010/main" val="3977547075"/>
+      </p:ext>
+    </p:extLst>
+  </p:cSld>
+  <p:clrMapOvr>
+    <a:masterClrMapping/>
+  </p:clrMapOvr>
+  <p:timing>
+    <p:tnLst>
+      <p:par>
+        <p:cTn id="1" dur="indefinite" restart="never" nodeType="tmRoot"/>
+      </p:par>
+    </p:tnLst>
+  </p:timing>
+</p:sld>
+</file>
+
+<file path=ppt/slides/slide11.xml><?xml version="1.0" encoding="utf-8"?>
+<p:sld xmlns:a="http://schemas.openxmlformats.org/drawingml/2006/main" xmlns:r="http://schemas.openxmlformats.org/officeDocument/2006/relationships" xmlns:p="http://schemas.openxmlformats.org/presentationml/2006/main">
+  <p:cSld>
+    <p:spTree>
+      <p:nvGrpSpPr>
+        <p:cNvPr id="1" name=""/>
+        <p:cNvGrpSpPr/>
+        <p:nvPr/>
+      </p:nvGrpSpPr>
+      <p:grpSpPr>
+        <a:xfrm>
+          <a:off x="0" y="0"/>
+          <a:ext cx="0" cy="0"/>
+          <a:chOff x="0" y="0"/>
+          <a:chExt cx="0" cy="0"/>
+        </a:xfrm>
+      </p:grpSpPr>
+      <p:sp>
+        <p:nvSpPr>
+          <p:cNvPr id="3" name="Подзаголовок 2"/>
+          <p:cNvSpPr>
+            <a:spLocks noGrp="1"/>
+          </p:cNvSpPr>
+          <p:nvPr>
+            <p:ph type="subTitle" idx="1"/>
+          </p:nvPr>
+        </p:nvSpPr>
+        <p:spPr>
+          <a:xfrm>
+            <a:off x="1418229" y="705515"/>
+            <a:ext cx="9144000" cy="754025"/>
+          </a:xfrm>
+        </p:spPr>
+        <p:txBody>
+          <a:bodyPr>
+            <a:normAutofit/>
+          </a:bodyPr>
+          <a:lstStyle/>
+          <a:p>
+            <a:pPr algn="ctr"/>
+            <a:r>
+              <a:rPr lang="en-US" sz="4400" dirty="0" smtClean="0">
+                <a:solidFill>
+                  <a:srgbClr val="FFFF00"/>
+                </a:solidFill>
+              </a:rPr>
+              <a:t>K-means </a:t>
+            </a:r>
+            <a:r>
+              <a:rPr lang="ru-RU" sz="4400" dirty="0" smtClean="0">
+                <a:solidFill>
+                  <a:srgbClr val="FFFF00"/>
+                </a:solidFill>
+              </a:rPr>
+              <a:t>алгоритм</a:t>
+            </a:r>
+            <a:endParaRPr lang="ru-RU" sz="4400" dirty="0">
+              <a:solidFill>
+                <a:srgbClr val="FFFF00"/>
+              </a:solidFill>
+            </a:endParaRPr>
+          </a:p>
+        </p:txBody>
+      </p:sp>
+      <p:sp>
+        <p:nvSpPr>
+          <p:cNvPr id="2" name="TextBox 1"/>
+          <p:cNvSpPr txBox="1"/>
+          <p:nvPr/>
+        </p:nvSpPr>
+        <p:spPr>
+          <a:xfrm>
+            <a:off x="675098" y="1421278"/>
+            <a:ext cx="8225329" cy="584775"/>
+          </a:xfrm>
+          <a:prstGeom prst="rect">
+            <a:avLst/>
+          </a:prstGeom>
+          <a:noFill/>
+        </p:spPr>
+        <p:txBody>
+          <a:bodyPr wrap="none" rtlCol="0">
+            <a:spAutoFit/>
+          </a:bodyPr>
+          <a:lstStyle/>
+          <a:p>
+            <a:r>
+              <a:rPr lang="en-US" sz="3200" dirty="0" smtClean="0">
+                <a:solidFill>
+                  <a:srgbClr val="FFFF00"/>
+                </a:solidFill>
+              </a:rPr>
+              <a:t>K-means</a:t>
+            </a:r>
+            <a:r>
+              <a:rPr lang="ru-RU" sz="3200" dirty="0" smtClean="0">
+                <a:solidFill>
+                  <a:srgbClr val="FFFF00"/>
+                </a:solidFill>
+              </a:rPr>
+              <a:t> – это частный случай </a:t>
+            </a:r>
+            <a:r>
+              <a:rPr lang="en-US" sz="3200" dirty="0" smtClean="0">
+                <a:solidFill>
+                  <a:srgbClr val="FFFF00"/>
+                </a:solidFill>
+              </a:rPr>
+              <a:t>EM </a:t>
+            </a:r>
+            <a:r>
+              <a:rPr lang="ru-RU" sz="3200" dirty="0" smtClean="0">
+                <a:solidFill>
+                  <a:srgbClr val="FFFF00"/>
+                </a:solidFill>
+              </a:rPr>
+              <a:t>алгоритма:</a:t>
+            </a:r>
+          </a:p>
+        </p:txBody>
+      </p:sp>
+      <p:sp>
+        <p:nvSpPr>
+          <p:cNvPr id="8" name="TextBox 7"/>
+          <p:cNvSpPr txBox="1"/>
+          <p:nvPr/>
+        </p:nvSpPr>
+        <p:spPr>
+          <a:xfrm>
+            <a:off x="675098" y="4415218"/>
+            <a:ext cx="2376997" cy="584775"/>
+          </a:xfrm>
+          <a:prstGeom prst="rect">
+            <a:avLst/>
+          </a:prstGeom>
+          <a:noFill/>
+        </p:spPr>
+        <p:txBody>
+          <a:bodyPr wrap="none" rtlCol="0">
+            <a:spAutoFit/>
+          </a:bodyPr>
+          <a:lstStyle/>
+          <a:p>
+            <a:r>
+              <a:rPr lang="ru-RU" sz="3200" dirty="0" smtClean="0">
+                <a:solidFill>
+                  <a:srgbClr val="FFFF00"/>
+                </a:solidFill>
+                <a:latin typeface="+mj-lt"/>
+              </a:rPr>
+              <a:t>Недостатки:</a:t>
+            </a:r>
+            <a:endParaRPr lang="ru-RU" sz="3200" dirty="0">
+              <a:solidFill>
+                <a:srgbClr val="FFFF00"/>
+              </a:solidFill>
+              <a:latin typeface="+mj-lt"/>
+            </a:endParaRPr>
+          </a:p>
+        </p:txBody>
+      </p:sp>
+      <mc:AlternateContent xmlns:mc="http://schemas.openxmlformats.org/markup-compatibility/2006">
+        <mc:Choice xmlns:a14="http://schemas.microsoft.com/office/drawing/2010/main" Requires="a14">
+          <p:sp>
+            <p:nvSpPr>
+              <p:cNvPr id="10" name="TextBox 9"/>
+              <p:cNvSpPr txBox="1"/>
+              <p:nvPr/>
+            </p:nvSpPr>
+            <p:spPr>
+              <a:xfrm>
+                <a:off x="1016976" y="1932956"/>
+                <a:ext cx="9946505" cy="1754326"/>
+              </a:xfrm>
+              <a:prstGeom prst="rect">
+                <a:avLst/>
+              </a:prstGeom>
+              <a:noFill/>
+            </p:spPr>
+            <p:txBody>
+              <a:bodyPr wrap="none" rtlCol="0">
+                <a:spAutoFit/>
+              </a:bodyPr>
+              <a:lstStyle/>
+              <a:p>
+                <a:pPr marL="342900" indent="-342900">
+                  <a:buFont typeface="Arial" panose="020B0604020202020204" pitchFamily="34" charset="0"/>
+                  <a:buChar char="•"/>
+                </a:pPr>
+                <a:r>
+                  <a:rPr lang="en-US" dirty="0">
+                    <a:solidFill>
+                      <a:srgbClr val="FFFF00"/>
+                    </a:solidFill>
+                  </a:rPr>
+                  <a:t>E-step – </a:t>
+                </a:r>
+                <a:r>
+                  <a:rPr lang="ru-RU" dirty="0">
+                    <a:solidFill>
+                      <a:srgbClr val="FFFF00"/>
+                    </a:solidFill>
+                  </a:rPr>
+                  <a:t>интересует не распределение, а только один кластер с большей вероятностью </a:t>
+                </a:r>
+                <a:endParaRPr lang="en-US" dirty="0">
+                  <a:solidFill>
+                    <a:srgbClr val="FFFF00"/>
+                  </a:solidFill>
+                </a:endParaRPr>
+              </a:p>
+              <a:p>
+                <a:r>
+                  <a:rPr lang="en-US" dirty="0">
+                    <a:solidFill>
+                      <a:srgbClr val="FFFF00"/>
+                    </a:solidFill>
+                  </a:rPr>
+                  <a:t> </a:t>
+                </a:r>
+                <a:r>
+                  <a:rPr lang="en-US" dirty="0">
+                    <a:solidFill>
+                      <a:srgbClr val="FFFF00"/>
+                    </a:solidFill>
+                  </a:rPr>
+                  <a:t>      </a:t>
+                </a:r>
+                <a:r>
+                  <a:rPr lang="ru-RU" dirty="0">
+                    <a:solidFill>
+                      <a:srgbClr val="FFFF00"/>
+                    </a:solidFill>
+                  </a:rPr>
+                  <a:t>(стратегия </a:t>
+                </a:r>
+                <a:r>
+                  <a:rPr lang="en-US" dirty="0">
+                    <a:solidFill>
+                      <a:srgbClr val="FFFF00"/>
+                    </a:solidFill>
+                  </a:rPr>
+                  <a:t>WTA)</a:t>
+                </a:r>
+              </a:p>
+              <a:p>
+                <a:pPr marL="342900" indent="-342900">
+                  <a:buFont typeface="Arial" panose="020B0604020202020204" pitchFamily="34" charset="0"/>
+                  <a:buChar char="•"/>
+                </a:pPr>
+                <a:r>
+                  <a:rPr lang="en-US" dirty="0">
+                    <a:solidFill>
+                      <a:srgbClr val="FFFF00"/>
+                    </a:solidFill>
+                  </a:rPr>
+                  <a:t>M-step</a:t>
+                </a:r>
+                <a:r>
+                  <a:rPr lang="ru-RU" dirty="0">
+                    <a:solidFill>
+                      <a:srgbClr val="FFFF00"/>
+                    </a:solidFill>
+                  </a:rPr>
+                  <a:t> – оставляем только числовые столбцы, а в качестве распределения берем </a:t>
+                </a:r>
+                <a14:m>
+                  <m:oMath xmlns:m="http://schemas.openxmlformats.org/officeDocument/2006/math">
+                    <m:r>
+                      <a:rPr lang="en-US" i="1">
+                        <a:solidFill>
+                          <a:srgbClr val="FFFF00"/>
+                        </a:solidFill>
+                        <a:effectLst>
+                          <a:outerShdw blurRad="469900" dist="342900" dir="5400000" sy="-20000" rotWithShape="0">
+                            <a:prstClr val="black">
+                              <a:alpha val="66000"/>
+                            </a:prstClr>
+                          </a:outerShdw>
+                        </a:effectLst>
+                        <a:latin typeface="Cambria Math" panose="02040503050406030204" pitchFamily="18" charset="0"/>
+                        <a:ea typeface="Cambria Math" panose="02040503050406030204" pitchFamily="18" charset="0"/>
+                      </a:rPr>
+                      <m:t>𝒩</m:t>
+                    </m:r>
+                    <m:d>
+                      <m:dPr>
+                        <m:ctrlPr>
+                          <a:rPr lang="ru-RU" i="1">
+                            <a:solidFill>
+                              <a:srgbClr val="FFFF00"/>
+                            </a:solidFill>
+                            <a:effectLst>
+                              <a:outerShdw blurRad="469900" dist="342900" dir="5400000" sy="-20000" rotWithShape="0">
+                                <a:prstClr val="black">
+                                  <a:alpha val="66000"/>
+                                </a:prstClr>
+                              </a:outerShdw>
+                            </a:effectLst>
+                            <a:latin typeface="Cambria Math" panose="02040503050406030204" pitchFamily="18" charset="0"/>
+                            <a:ea typeface="Cambria Math" panose="02040503050406030204" pitchFamily="18" charset="0"/>
+                          </a:rPr>
+                        </m:ctrlPr>
+                      </m:dPr>
+                      <m:e>
+                        <m:r>
+                          <a:rPr lang="en-US" i="1">
+                            <a:solidFill>
+                              <a:srgbClr val="FFFF00"/>
+                            </a:solidFill>
+                            <a:effectLst>
+                              <a:outerShdw blurRad="469900" dist="342900" dir="5400000" sy="-20000" rotWithShape="0">
+                                <a:prstClr val="black">
+                                  <a:alpha val="66000"/>
+                                </a:prstClr>
+                              </a:outerShdw>
+                            </a:effectLst>
+                            <a:latin typeface="Cambria Math" panose="02040503050406030204" pitchFamily="18" charset="0"/>
+                            <a:ea typeface="Cambria Math" panose="02040503050406030204" pitchFamily="18" charset="0"/>
+                          </a:rPr>
+                          <m:t>𝑥</m:t>
+                        </m:r>
+                      </m:e>
+                      <m:e>
+                        <m:sSub>
+                          <m:sSubPr>
+                            <m:ctrlPr>
+                              <a:rPr lang="en-US" i="1">
+                                <a:solidFill>
+                                  <a:srgbClr val="FFFF00"/>
+                                </a:solidFill>
+                                <a:effectLst>
+                                  <a:outerShdw blurRad="469900" dist="342900" dir="5400000" sy="-20000" rotWithShape="0">
+                                    <a:prstClr val="black">
+                                      <a:alpha val="66000"/>
+                                    </a:prstClr>
+                                  </a:outerShdw>
+                                </a:effectLst>
+                                <a:latin typeface="Cambria Math" panose="02040503050406030204" pitchFamily="18" charset="0"/>
+                                <a:ea typeface="Cambria Math" panose="02040503050406030204" pitchFamily="18" charset="0"/>
+                              </a:rPr>
+                            </m:ctrlPr>
+                          </m:sSubPr>
+                          <m:e>
+                            <m:r>
+                              <a:rPr lang="en-US" i="1">
+                                <a:solidFill>
+                                  <a:srgbClr val="FFFF00"/>
+                                </a:solidFill>
+                                <a:effectLst>
+                                  <a:outerShdw blurRad="469900" dist="342900" dir="5400000" sy="-20000" rotWithShape="0">
+                                    <a:prstClr val="black">
+                                      <a:alpha val="66000"/>
+                                    </a:prstClr>
+                                  </a:outerShdw>
+                                </a:effectLst>
+                                <a:latin typeface="Cambria Math" panose="02040503050406030204" pitchFamily="18" charset="0"/>
+                                <a:ea typeface="Cambria Math" panose="02040503050406030204" pitchFamily="18" charset="0"/>
+                              </a:rPr>
+                              <m:t>𝜇</m:t>
+                            </m:r>
+                          </m:e>
+                          <m:sub>
+                            <m:r>
+                              <a:rPr lang="en-US" i="1">
+                                <a:solidFill>
+                                  <a:srgbClr val="FFFF00"/>
+                                </a:solidFill>
+                                <a:effectLst>
+                                  <a:outerShdw blurRad="469900" dist="342900" dir="5400000" sy="-20000" rotWithShape="0">
+                                    <a:prstClr val="black">
+                                      <a:alpha val="66000"/>
+                                    </a:prstClr>
+                                  </a:outerShdw>
+                                </a:effectLst>
+                                <a:latin typeface="Cambria Math" panose="02040503050406030204" pitchFamily="18" charset="0"/>
+                                <a:ea typeface="Cambria Math" panose="02040503050406030204" pitchFamily="18" charset="0"/>
+                              </a:rPr>
+                              <m:t>𝑐𝑠</m:t>
+                            </m:r>
+                          </m:sub>
+                        </m:sSub>
+                        <m:r>
+                          <a:rPr lang="en-US" i="1">
+                            <a:solidFill>
+                              <a:srgbClr val="FFFF00"/>
+                            </a:solidFill>
+                            <a:effectLst>
+                              <a:outerShdw blurRad="469900" dist="342900" dir="5400000" sy="-20000" rotWithShape="0">
+                                <a:prstClr val="black">
+                                  <a:alpha val="66000"/>
+                                </a:prstClr>
+                              </a:outerShdw>
+                            </a:effectLst>
+                            <a:latin typeface="Cambria Math" panose="02040503050406030204" pitchFamily="18" charset="0"/>
+                            <a:ea typeface="Cambria Math" panose="02040503050406030204" pitchFamily="18" charset="0"/>
+                          </a:rPr>
+                          <m:t>,</m:t>
+                        </m:r>
+                        <m:r>
+                          <a:rPr lang="ru-RU" i="1">
+                            <a:solidFill>
+                              <a:srgbClr val="FFFF00"/>
+                            </a:solidFill>
+                            <a:effectLst>
+                              <a:outerShdw blurRad="469900" dist="342900" dir="5400000" sy="-20000" rotWithShape="0">
+                                <a:prstClr val="black">
+                                  <a:alpha val="66000"/>
+                                </a:prstClr>
+                              </a:outerShdw>
+                            </a:effectLst>
+                            <a:latin typeface="Cambria Math" panose="02040503050406030204" pitchFamily="18" charset="0"/>
+                            <a:ea typeface="Cambria Math" panose="02040503050406030204" pitchFamily="18" charset="0"/>
+                          </a:rPr>
+                          <m:t>1</m:t>
+                        </m:r>
+                      </m:e>
+                    </m:d>
+                    <m:r>
+                      <a:rPr lang="ru-RU">
+                        <a:solidFill>
+                          <a:srgbClr val="FFFF00"/>
+                        </a:solidFill>
+                        <a:effectLst>
+                          <a:outerShdw blurRad="469900" dist="342900" dir="5400000" sy="-20000" rotWithShape="0">
+                            <a:prstClr val="black">
+                              <a:alpha val="66000"/>
+                            </a:prstClr>
+                          </a:outerShdw>
+                        </a:effectLst>
+                        <a:latin typeface="Cambria Math" panose="02040503050406030204" pitchFamily="18" charset="0"/>
+                        <a:ea typeface="Cambria Math" panose="02040503050406030204" pitchFamily="18" charset="0"/>
+                      </a:rPr>
+                      <m:t>,</m:t>
+                    </m:r>
+                  </m:oMath>
+                </a14:m>
+                <a:r>
+                  <a:rPr lang="ru-RU" dirty="0">
+                    <a:solidFill>
+                      <a:srgbClr val="FFFF00"/>
+                    </a:solidFill>
+                  </a:rPr>
+                  <a:t> </a:t>
+                </a:r>
+              </a:p>
+              <a:p>
+                <a:r>
+                  <a:rPr lang="ru-RU" dirty="0">
+                    <a:solidFill>
+                      <a:srgbClr val="FFFF00"/>
+                    </a:solidFill>
+                  </a:rPr>
+                  <a:t>       таким образом вводится евклидова метрика и вместо максимума ищется минимум суммы </a:t>
+                </a:r>
+              </a:p>
+              <a:p>
+                <a:r>
+                  <a:rPr lang="ru-RU" dirty="0">
+                    <a:solidFill>
+                      <a:srgbClr val="FFFF00"/>
+                    </a:solidFill>
+                  </a:rPr>
+                  <a:t> </a:t>
+                </a:r>
+                <a:r>
+                  <a:rPr lang="ru-RU" dirty="0">
+                    <a:solidFill>
+                      <a:srgbClr val="FFFF00"/>
+                    </a:solidFill>
+                  </a:rPr>
+                  <a:t>      </a:t>
+                </a:r>
+                <a:r>
+                  <a:rPr lang="ru-RU" dirty="0" err="1">
+                    <a:solidFill>
+                      <a:srgbClr val="FFFF00"/>
+                    </a:solidFill>
+                  </a:rPr>
+                  <a:t>внутрикластерных</a:t>
+                </a:r>
+                <a:r>
+                  <a:rPr lang="ru-RU" dirty="0">
+                    <a:solidFill>
+                      <a:srgbClr val="FFFF00"/>
+                    </a:solidFill>
+                  </a:rPr>
+                  <a:t> расстояний</a:t>
+                </a:r>
+                <a:endParaRPr lang="ru-RU" dirty="0">
+                  <a:solidFill>
+                    <a:srgbClr val="FFFF00"/>
+                  </a:solidFill>
+                </a:endParaRPr>
+              </a:p>
+              <a:p>
+                <a:endParaRPr lang="ru-RU" dirty="0"/>
+              </a:p>
+            </p:txBody>
+          </p:sp>
+        </mc:Choice>
+        <mc:Fallback>
+          <p:sp>
+            <p:nvSpPr>
+              <p:cNvPr id="10" name="TextBox 9"/>
+              <p:cNvSpPr txBox="1">
+                <a:spLocks noRot="1" noChangeAspect="1" noMove="1" noResize="1" noEditPoints="1" noAdjustHandles="1" noChangeArrowheads="1" noChangeShapeType="1" noTextEdit="1"/>
+              </p:cNvSpPr>
+              <p:nvPr/>
+            </p:nvSpPr>
+            <p:spPr>
+              <a:xfrm>
+                <a:off x="1016976" y="1932956"/>
+                <a:ext cx="9946505" cy="1754326"/>
+              </a:xfrm>
+              <a:prstGeom prst="rect">
+                <a:avLst/>
+              </a:prstGeom>
+              <a:blipFill rotWithShape="0">
+                <a:blip r:embed="rId2"/>
+                <a:stretch>
+                  <a:fillRect l="-429" t="-1736"/>
+                </a:stretch>
+              </a:blipFill>
+            </p:spPr>
+            <p:txBody>
+              <a:bodyPr/>
+              <a:lstStyle/>
+              <a:p>
+                <a:r>
+                  <a:rPr lang="ru-RU">
+                    <a:noFill/>
+                  </a:rPr>
+                  <a:t> </a:t>
+                </a:r>
+              </a:p>
+            </p:txBody>
+          </p:sp>
+        </mc:Fallback>
+      </mc:AlternateContent>
+      <p:sp>
+        <p:nvSpPr>
+          <p:cNvPr id="11" name="TextBox 10"/>
+          <p:cNvSpPr txBox="1"/>
+          <p:nvPr/>
+        </p:nvSpPr>
+        <p:spPr>
+          <a:xfrm>
+            <a:off x="1016976" y="4976882"/>
+            <a:ext cx="7374519" cy="1200329"/>
+          </a:xfrm>
+          <a:prstGeom prst="rect">
+            <a:avLst/>
+          </a:prstGeom>
+          <a:noFill/>
+        </p:spPr>
+        <p:txBody>
+          <a:bodyPr wrap="none" rtlCol="0">
+            <a:spAutoFit/>
+          </a:bodyPr>
+          <a:lstStyle/>
+          <a:p>
+            <a:pPr marL="285750" indent="-285750">
+              <a:buFont typeface="Arial" panose="020B0604020202020204" pitchFamily="34" charset="0"/>
+              <a:buChar char="•"/>
+            </a:pPr>
+            <a:r>
+              <a:rPr lang="ru-RU" dirty="0" smtClean="0">
+                <a:solidFill>
+                  <a:srgbClr val="FFFF00"/>
+                </a:solidFill>
+              </a:rPr>
+              <a:t>Слишком много упрощений: используются только числовые столбцы</a:t>
+            </a:r>
+          </a:p>
+          <a:p>
+            <a:pPr marL="285750" indent="-285750">
+              <a:buFont typeface="Arial" panose="020B0604020202020204" pitchFamily="34" charset="0"/>
+              <a:buChar char="•"/>
+            </a:pPr>
+            <a:r>
+              <a:rPr lang="ru-RU" dirty="0" smtClean="0">
+                <a:solidFill>
+                  <a:srgbClr val="FFFF00"/>
+                </a:solidFill>
+              </a:rPr>
+              <a:t>Серьезные проблемы с неполными данными </a:t>
+            </a:r>
+          </a:p>
+          <a:p>
+            <a:pPr marL="285750" indent="-285750">
+              <a:buFont typeface="Arial" panose="020B0604020202020204" pitchFamily="34" charset="0"/>
+              <a:buChar char="•"/>
+            </a:pPr>
+            <a:r>
+              <a:rPr lang="ru-RU" dirty="0" smtClean="0">
+                <a:solidFill>
+                  <a:srgbClr val="FFFF00"/>
+                </a:solidFill>
+              </a:rPr>
+              <a:t>Нельзя задать ограничения на кластеры</a:t>
+            </a:r>
+          </a:p>
+          <a:p>
+            <a:pPr marL="285750" indent="-285750">
+              <a:buFont typeface="Arial" panose="020B0604020202020204" pitchFamily="34" charset="0"/>
+              <a:buChar char="•"/>
+            </a:pPr>
+            <a:r>
+              <a:rPr lang="ru-RU" dirty="0" smtClean="0">
+                <a:solidFill>
+                  <a:srgbClr val="FFFF00"/>
+                </a:solidFill>
+              </a:rPr>
+              <a:t>Переобучается и неустойчив к выбросам</a:t>
+            </a:r>
+            <a:endParaRPr lang="ru-RU" dirty="0">
+              <a:solidFill>
+                <a:srgbClr val="FFFF00"/>
+              </a:solidFill>
+            </a:endParaRPr>
+          </a:p>
+        </p:txBody>
+      </p:sp>
+      <p:sp>
+        <p:nvSpPr>
+          <p:cNvPr id="12" name="TextBox 11"/>
+          <p:cNvSpPr txBox="1"/>
+          <p:nvPr/>
+        </p:nvSpPr>
+        <p:spPr>
+          <a:xfrm>
+            <a:off x="675098" y="3398728"/>
+            <a:ext cx="2943434" cy="584775"/>
+          </a:xfrm>
+          <a:prstGeom prst="rect">
+            <a:avLst/>
+          </a:prstGeom>
+          <a:noFill/>
+        </p:spPr>
+        <p:txBody>
+          <a:bodyPr wrap="none" rtlCol="0">
+            <a:spAutoFit/>
+          </a:bodyPr>
+          <a:lstStyle/>
+          <a:p>
+            <a:r>
+              <a:rPr lang="ru-RU" sz="3200" dirty="0" smtClean="0">
+                <a:solidFill>
+                  <a:srgbClr val="FFFF00"/>
+                </a:solidFill>
+                <a:latin typeface="+mj-lt"/>
+              </a:rPr>
+              <a:t>Преимущества:</a:t>
+            </a:r>
+            <a:endParaRPr lang="ru-RU" sz="3200" dirty="0">
+              <a:solidFill>
+                <a:srgbClr val="FFFF00"/>
+              </a:solidFill>
+              <a:latin typeface="+mj-lt"/>
+            </a:endParaRPr>
+          </a:p>
+        </p:txBody>
+      </p:sp>
+      <p:sp>
+        <p:nvSpPr>
+          <p:cNvPr id="13" name="TextBox 12"/>
+          <p:cNvSpPr txBox="1"/>
+          <p:nvPr/>
+        </p:nvSpPr>
+        <p:spPr>
+          <a:xfrm>
+            <a:off x="1016976" y="3934331"/>
+            <a:ext cx="4099199" cy="369332"/>
+          </a:xfrm>
+          <a:prstGeom prst="rect">
+            <a:avLst/>
+          </a:prstGeom>
+          <a:noFill/>
+        </p:spPr>
+        <p:txBody>
+          <a:bodyPr wrap="none" rtlCol="0">
+            <a:spAutoFit/>
+          </a:bodyPr>
+          <a:lstStyle/>
+          <a:p>
+            <a:pPr marL="285750" indent="-285750">
+              <a:buFont typeface="Arial" panose="020B0604020202020204" pitchFamily="34" charset="0"/>
+              <a:buChar char="•"/>
+            </a:pPr>
+            <a:r>
+              <a:rPr lang="ru-RU" dirty="0" smtClean="0">
+                <a:solidFill>
+                  <a:srgbClr val="FFFF00"/>
+                </a:solidFill>
+              </a:rPr>
+              <a:t>Простой и универсальный алгоритм</a:t>
+            </a:r>
+          </a:p>
+        </p:txBody>
+      </p:sp>
+    </p:spTree>
+    <p:extLst>
+      <p:ext uri="{BB962C8B-B14F-4D97-AF65-F5344CB8AC3E}">
+        <p14:creationId xmlns:p14="http://schemas.microsoft.com/office/powerpoint/2010/main" val="2229533416"/>
+      </p:ext>
+    </p:extLst>
+  </p:cSld>
+  <p:clrMapOvr>
+    <a:masterClrMapping/>
+  </p:clrMapOvr>
+  <p:timing>
+    <p:tnLst>
+      <p:par>
+        <p:cTn id="1" dur="indefinite" restart="never" nodeType="tmRoot"/>
+      </p:par>
+    </p:tnLst>
+  </p:timing>
+</p:sld>
+</file>
+
+<file path=ppt/slides/slide12.xml><?xml version="1.0" encoding="utf-8"?>
+<p:sld xmlns:a="http://schemas.openxmlformats.org/drawingml/2006/main" xmlns:r="http://schemas.openxmlformats.org/officeDocument/2006/relationships" xmlns:p="http://schemas.openxmlformats.org/presentationml/2006/main">
+  <p:cSld>
+    <p:spTree>
+      <p:nvGrpSpPr>
+        <p:cNvPr id="1" name=""/>
+        <p:cNvGrpSpPr/>
+        <p:nvPr/>
+      </p:nvGrpSpPr>
+      <p:grpSpPr>
+        <a:xfrm>
+          <a:off x="0" y="0"/>
+          <a:ext cx="0" cy="0"/>
+          <a:chOff x="0" y="0"/>
+          <a:chExt cx="0" cy="0"/>
+        </a:xfrm>
+      </p:grpSpPr>
+      <p:pic>
+        <p:nvPicPr>
+          <p:cNvPr id="5" name="Рисунок 4"/>
+          <p:cNvPicPr>
+            <a:picLocks noChangeAspect="1"/>
+          </p:cNvPicPr>
+          <p:nvPr/>
+        </p:nvPicPr>
+        <p:blipFill>
+          <a:blip r:embed="rId2">
+            <a:extLst>
+              <a:ext uri="{28A0092B-C50C-407E-A947-70E740481C1C}">
+                <a14:useLocalDpi xmlns:a14="http://schemas.microsoft.com/office/drawing/2010/main" val="0"/>
+              </a:ext>
+            </a:extLst>
+          </a:blip>
+          <a:stretch>
+            <a:fillRect/>
+          </a:stretch>
+        </p:blipFill>
+        <p:spPr>
+          <a:xfrm>
+            <a:off x="3138985" y="1234936"/>
+            <a:ext cx="5773003" cy="4482567"/>
+          </a:xfrm>
+          <a:prstGeom prst="rect">
+            <a:avLst/>
+          </a:prstGeom>
+        </p:spPr>
+      </p:pic>
+    </p:spTree>
+    <p:extLst>
+      <p:ext uri="{BB962C8B-B14F-4D97-AF65-F5344CB8AC3E}">
+        <p14:creationId xmlns:p14="http://schemas.microsoft.com/office/powerpoint/2010/main" val="2469521059"/>
+      </p:ext>
+    </p:extLst>
+  </p:cSld>
+  <p:clrMapOvr>
+    <a:masterClrMapping/>
+  </p:clrMapOvr>
+</p:sld>
+</file>
+
+<file path=ppt/slides/slide2.xml><?xml version="1.0" encoding="utf-8"?>
+<p:sld xmlns:a="http://schemas.openxmlformats.org/drawingml/2006/main" xmlns:r="http://schemas.openxmlformats.org/officeDocument/2006/relationships" xmlns:p="http://schemas.openxmlformats.org/presentationml/2006/main">
+  <p:cSld>
+    <p:spTree>
+      <p:nvGrpSpPr>
+        <p:cNvPr id="1" name=""/>
+        <p:cNvGrpSpPr/>
+        <p:nvPr/>
+      </p:nvGrpSpPr>
+      <p:grpSpPr>
+        <a:xfrm>
+          <a:off x="0" y="0"/>
+          <a:ext cx="0" cy="0"/>
+          <a:chOff x="0" y="0"/>
+          <a:chExt cx="0" cy="0"/>
+        </a:xfrm>
+      </p:grpSpPr>
+      <p:sp>
+        <p:nvSpPr>
           <p:cNvPr id="2" name="Заголовок 1"/>
           <p:cNvSpPr>
             <a:spLocks noGrp="1"/>
@@ -7161,12 +9290,20 @@
               <a:buChar char="•"/>
             </a:pPr>
             <a:r>
+              <a:rPr lang="ru-RU" sz="2400" dirty="0" smtClean="0">
+                <a:solidFill>
+                  <a:srgbClr val="FFFF00"/>
+                </a:solidFill>
+              </a:rPr>
+              <a:t>Настроить в качестве коллектора </a:t>
+            </a:r>
+            <a:r>
               <a:rPr lang="ru-RU" sz="2400" dirty="0">
                 <a:solidFill>
                   <a:srgbClr val="FFFF00"/>
                 </a:solidFill>
               </a:rPr>
-              <a:t>Настроить кластер на базе </a:t>
+              <a:t>кластер на базе </a:t>
             </a:r>
             <a:r>
               <a:rPr lang="en-US" sz="2400" dirty="0">
@@ -7301,7 +9438,7 @@
 </p:sld>
 </file>
 
-<file path=ppt/slides/slide2.xml><?xml version="1.0" encoding="utf-8"?>
+<file path=ppt/slides/slide3.xml><?xml version="1.0" encoding="utf-8"?>
 <p:sld xmlns:a="http://schemas.openxmlformats.org/drawingml/2006/main" xmlns:r="http://schemas.openxmlformats.org/officeDocument/2006/relationships" xmlns:p="http://schemas.openxmlformats.org/presentationml/2006/main">
   <p:cSld>
     <p:spTree>
@@ -8715,7 +10852,7 @@
 </p:sld>
 </file>
 
-<file path=ppt/slides/slide3.xml><?xml version="1.0" encoding="utf-8"?>
+<file path=ppt/slides/slide4.xml><?xml version="1.0" encoding="utf-8"?>
 <p:sld xmlns:a="http://schemas.openxmlformats.org/drawingml/2006/main" xmlns:r="http://schemas.openxmlformats.org/officeDocument/2006/relationships" xmlns:p="http://schemas.openxmlformats.org/presentationml/2006/main">
   <p:cSld>
     <p:spTree>
@@ -9137,7 +11274,7 @@
 </p:sld>
 </file>
 
-<file path=ppt/slides/slide4.xml><?xml version="1.0" encoding="utf-8"?>
+<file path=ppt/slides/slide5.xml><?xml version="1.0" encoding="utf-8"?>
 <p:sld xmlns:a="http://schemas.openxmlformats.org/drawingml/2006/main" xmlns:r="http://schemas.openxmlformats.org/officeDocument/2006/relationships" xmlns:p="http://schemas.openxmlformats.org/presentationml/2006/main">
   <p:cSld>
     <p:spTree>
@@ -10503,7 +12640,7 @@
 </p:sld>
 </file>
 
-<file path=ppt/slides/slide5.xml><?xml version="1.0" encoding="utf-8"?>
+<file path=ppt/slides/slide6.xml><?xml version="1.0" encoding="utf-8"?>
 <p:sld xmlns:a="http://schemas.openxmlformats.org/drawingml/2006/main" xmlns:r="http://schemas.openxmlformats.org/officeDocument/2006/relationships" xmlns:p="http://schemas.openxmlformats.org/presentationml/2006/main">
   <p:cSld>
     <p:spTree>
@@ -10520,8 +12657,8 @@
           <a:chExt cx="0" cy="0"/>
         </a:xfrm>
       </p:grpSpPr>
-      <mc:AlternateContent xmlns:mc="http://schemas.openxmlformats.org/markup-compatibility/2006" xmlns:a14="http://schemas.microsoft.com/office/drawing/2010/main">
-        <mc:Choice Requires="a14">
+      <mc:AlternateContent xmlns:mc="http://schemas.openxmlformats.org/markup-compatibility/2006">
+        <mc:Choice xmlns:a14="http://schemas.microsoft.com/office/drawing/2010/main" Requires="a14">
           <p:sp>
             <p:nvSpPr>
               <p:cNvPr id="2" name="Заголовок 1"/>
@@ -10972,22 +13109,22 @@
                     <m:sSub>
                       <m:sSubPr>
                         <m:ctrlPr>
-                          <a:rPr lang="en-US" sz="2000" i="1" spc="0" dirty="0" smtClean="0">
+                          <a:rPr lang="en-US" sz="2000" spc="0" dirty="0">
                             <a:solidFill>
                               <a:srgbClr val="FFFF00"/>
                             </a:solidFill>
-                            <a:latin typeface="Cambria Math" panose="02040503050406030204" pitchFamily="18" charset="0"/>
+                            <a:latin typeface="+mn-lt"/>
                             <a:ea typeface="Cambria Math" panose="02040503050406030204" pitchFamily="18" charset="0"/>
                           </a:rPr>
                         </m:ctrlPr>
                       </m:sSubPr>
                       <m:e>
                         <m:r>
-                          <a:rPr lang="en-US" sz="2000" b="0" i="1" spc="0" dirty="0" smtClean="0">
+                          <a:rPr lang="en-US" sz="2000" spc="0" dirty="0">
                             <a:solidFill>
                               <a:srgbClr val="FFFF00"/>
                             </a:solidFill>
-                            <a:latin typeface="Cambria Math" panose="02040503050406030204" pitchFamily="18" charset="0"/>
+                            <a:latin typeface="+mn-lt"/>
                             <a:ea typeface="Cambria Math" panose="02040503050406030204" pitchFamily="18" charset="0"/>
                           </a:rPr>
                           <m:t>𝑢</m:t>
@@ -10995,11 +13132,11 @@
                       </m:e>
                       <m:sub>
                         <m:r>
-                          <a:rPr lang="en-US" sz="2000" b="0" i="1" spc="0" dirty="0" smtClean="0">
+                          <a:rPr lang="en-US" sz="2000" spc="0" dirty="0">
                             <a:solidFill>
                               <a:srgbClr val="FFFF00"/>
                             </a:solidFill>
-                            <a:latin typeface="Cambria Math" panose="02040503050406030204" pitchFamily="18" charset="0"/>
+                            <a:latin typeface="+mn-lt"/>
                             <a:ea typeface="Cambria Math" panose="02040503050406030204" pitchFamily="18" charset="0"/>
                           </a:rPr>
                           <m:t>2</m:t>
@@ -11007,11 +13144,11 @@
                       </m:sub>
                     </m:sSub>
                     <m:r>
-                      <a:rPr lang="en-US" sz="2000" b="0" i="1" spc="0" dirty="0" smtClean="0">
+                      <a:rPr lang="en-US" sz="2000" spc="0" dirty="0">
                         <a:solidFill>
                           <a:srgbClr val="FFFF00"/>
                         </a:solidFill>
-                        <a:latin typeface="Cambria Math" panose="02040503050406030204" pitchFamily="18" charset="0"/>
+                        <a:latin typeface="+mn-lt"/>
                         <a:ea typeface="Cambria Math" panose="02040503050406030204" pitchFamily="18" charset="0"/>
                       </a:rPr>
                       <m:t>, …, </m:t>
@@ -11019,22 +13156,22 @@
                     <m:sSub>
                       <m:sSubPr>
                         <m:ctrlPr>
-                          <a:rPr lang="en-US" sz="2000" b="0" i="1" spc="0" dirty="0" smtClean="0">
+                          <a:rPr lang="en-US" sz="2000" spc="0" dirty="0">
                             <a:solidFill>
                               <a:srgbClr val="FFFF00"/>
                             </a:solidFill>
-                            <a:latin typeface="Cambria Math" panose="02040503050406030204" pitchFamily="18" charset="0"/>
+                            <a:latin typeface="+mn-lt"/>
                             <a:ea typeface="Cambria Math" panose="02040503050406030204" pitchFamily="18" charset="0"/>
                           </a:rPr>
                         </m:ctrlPr>
                       </m:sSubPr>
                       <m:e>
                         <m:r>
-                          <a:rPr lang="en-US" sz="2000" b="0" i="1" spc="0" dirty="0" smtClean="0">
+                          <a:rPr lang="en-US" sz="2000" spc="0" dirty="0">
                             <a:solidFill>
                               <a:srgbClr val="FFFF00"/>
                             </a:solidFill>
-                            <a:latin typeface="Cambria Math" panose="02040503050406030204" pitchFamily="18" charset="0"/>
+                            <a:latin typeface="+mn-lt"/>
                             <a:ea typeface="Cambria Math" panose="02040503050406030204" pitchFamily="18" charset="0"/>
                           </a:rPr>
                           <m:t>𝑢</m:t>
@@ -11042,11 +13179,11 @@
                       </m:e>
                       <m:sub>
                         <m:r>
-                          <a:rPr lang="en-US" sz="2000" b="0" i="1" spc="0" dirty="0" smtClean="0">
+                          <a:rPr lang="en-US" sz="2000" spc="0" dirty="0">
                             <a:solidFill>
                               <a:srgbClr val="FFFF00"/>
                             </a:solidFill>
-                            <a:latin typeface="Cambria Math" panose="02040503050406030204" pitchFamily="18" charset="0"/>
+                            <a:latin typeface="+mn-lt"/>
                             <a:ea typeface="Cambria Math" panose="02040503050406030204" pitchFamily="18" charset="0"/>
                           </a:rPr>
                           <m:t>𝑛</m:t>
@@ -11054,61 +13191,61 @@
                       </m:sub>
                     </m:sSub>
                     <m:r>
-                      <a:rPr lang="en-US" sz="2000" b="0" i="1" spc="0" dirty="0" smtClean="0">
+                      <a:rPr lang="en-US" sz="2000" spc="0" dirty="0">
                         <a:solidFill>
                           <a:srgbClr val="FFFF00"/>
                         </a:solidFill>
-                        <a:latin typeface="Cambria Math" panose="02040503050406030204" pitchFamily="18" charset="0"/>
+                        <a:latin typeface="+mn-lt"/>
                         <a:ea typeface="Cambria Math" panose="02040503050406030204" pitchFamily="18" charset="0"/>
                       </a:rPr>
                       <m:t>,…}−</m:t>
                     </m:r>
                     <m:r>
-                      <a:rPr lang="ru-RU" sz="2000" b="0" i="1" spc="0" dirty="0" smtClean="0">
+                      <a:rPr lang="ru-RU" sz="2000" spc="0" dirty="0">
                         <a:solidFill>
                           <a:srgbClr val="FFFF00"/>
                         </a:solidFill>
-                        <a:latin typeface="Cambria Math" panose="02040503050406030204" pitchFamily="18" charset="0"/>
+                        <a:latin typeface="+mn-lt"/>
                         <a:ea typeface="Cambria Math" panose="02040503050406030204" pitchFamily="18" charset="0"/>
                       </a:rPr>
                       <m:t>пользователи (определяются по </m:t>
                     </m:r>
                     <m:r>
-                      <a:rPr lang="en-US" sz="2000" b="0" i="1" spc="0" dirty="0" smtClean="0">
+                      <a:rPr lang="en-US" sz="2000" spc="0" dirty="0">
                         <a:solidFill>
                           <a:srgbClr val="FFFF00"/>
                         </a:solidFill>
-                        <a:latin typeface="Cambria Math" panose="02040503050406030204" pitchFamily="18" charset="0"/>
+                        <a:latin typeface="+mn-lt"/>
                         <a:ea typeface="Cambria Math" panose="02040503050406030204" pitchFamily="18" charset="0"/>
                       </a:rPr>
                       <m:t>𝑀𝐴𝐶</m:t>
                     </m:r>
                     <m:r>
-                      <a:rPr lang="ru-RU" sz="2000" b="0" i="1" spc="0" dirty="0" smtClean="0">
+                      <a:rPr lang="ru-RU" sz="2000" spc="0" dirty="0">
                         <a:solidFill>
                           <a:srgbClr val="FFFF00"/>
                         </a:solidFill>
-                        <a:latin typeface="Cambria Math" panose="02040503050406030204" pitchFamily="18" charset="0"/>
+                        <a:latin typeface="+mn-lt"/>
                         <a:ea typeface="Cambria Math" panose="02040503050406030204" pitchFamily="18" charset="0"/>
                       </a:rPr>
                       <m:t> адресу </m:t>
                     </m:r>
                     <m:r>
-                      <a:rPr lang="en-US" sz="2000" b="0" i="1" spc="0" dirty="0" smtClean="0">
+                      <a:rPr lang="en-US" sz="2000" spc="0" dirty="0">
                         <a:solidFill>
                           <a:srgbClr val="FFFF00"/>
                         </a:solidFill>
-                        <a:latin typeface="Cambria Math" panose="02040503050406030204" pitchFamily="18" charset="0"/>
+                        <a:latin typeface="+mn-lt"/>
                         <a:ea typeface="Cambria Math" panose="02040503050406030204" pitchFamily="18" charset="0"/>
                       </a:rPr>
                       <m:t>𝑆𝑇𝐵</m:t>
                     </m:r>
                     <m:r>
-                      <a:rPr lang="en-US" sz="2000" b="0" i="1" spc="0" dirty="0" smtClean="0">
+                      <a:rPr lang="en-US" sz="2000" spc="0" dirty="0">
                         <a:solidFill>
                           <a:srgbClr val="FFFF00"/>
                         </a:solidFill>
-                        <a:latin typeface="Cambria Math" panose="02040503050406030204" pitchFamily="18" charset="0"/>
+                        <a:latin typeface="+mn-lt"/>
                         <a:ea typeface="Cambria Math" panose="02040503050406030204" pitchFamily="18" charset="0"/>
                       </a:rPr>
                       <m:t>)</m:t>
@@ -11145,7 +13282,7 @@
             </p:txBody>
           </p:sp>
         </mc:Choice>
-        <mc:Fallback xmlns="">
+        <mc:Fallback>
           <p:sp>
             <p:nvSpPr>
               <p:cNvPr id="2" name="Заголовок 1"/>
@@ -12416,7 +14553,7 @@
                           <a:ea typeface="Cambria Math" panose="02040503050406030204" pitchFamily="18" charset="0"/>
                           <a:cs typeface="+mj-cs"/>
                         </a:rPr>
-                        <m:t> берем из обучающего </m:t>
+                        <m:t> берем из обучающего батча пакетов за</m:t>
                       </m:r>
                       <m:r>
                         <a:rPr lang="ru-RU" dirty="0">
@@ -12434,7 +14571,7 @@
                           <a:ea typeface="Cambria Math" panose="02040503050406030204" pitchFamily="18" charset="0"/>
                           <a:cs typeface="+mj-cs"/>
                         </a:rPr>
-                        <m:t>батча пакетов за время </m:t>
+                        <m:t> время </m:t>
                       </m:r>
                       <m:r>
                         <a:rPr lang="en-US" dirty="0">
@@ -12534,7 +14671,7 @@
 </p:sld>
 </file>
 
-<file path=ppt/slides/slide6.xml><?xml version="1.0" encoding="utf-8"?>
+<file path=ppt/slides/slide7.xml><?xml version="1.0" encoding="utf-8"?>
 <p:sld xmlns:a="http://schemas.openxmlformats.org/drawingml/2006/main" xmlns:r="http://schemas.openxmlformats.org/officeDocument/2006/relationships" xmlns:p="http://schemas.openxmlformats.org/presentationml/2006/main">
   <p:cSld>
     <p:spTree>
@@ -12551,8 +14688,8 @@
           <a:chExt cx="0" cy="0"/>
         </a:xfrm>
       </p:grpSpPr>
-      <mc:AlternateContent xmlns:mc="http://schemas.openxmlformats.org/markup-compatibility/2006" xmlns:a14="http://schemas.microsoft.com/office/drawing/2010/main">
-        <mc:Choice Requires="a14">
+      <mc:AlternateContent xmlns:mc="http://schemas.openxmlformats.org/markup-compatibility/2006">
+        <mc:Choice xmlns:a14="http://schemas.microsoft.com/office/drawing/2010/main" Requires="a14">
           <p:sp>
             <p:nvSpPr>
               <p:cNvPr id="2" name="Заголовок 1"/>
@@ -13358,7 +15495,37 @@
                         <a:latin typeface="Cambria Math" panose="02040503050406030204" pitchFamily="18" charset="0"/>
                         <a:ea typeface="Cambria Math" panose="02040503050406030204" pitchFamily="18" charset="0"/>
                       </a:rPr>
-                      <m:t>кластеры, количество кластеров −доп. параметр модели</m:t>
+                      <m:t>кластеры, количество кластеров</m:t>
+                    </m:r>
+                    <m:r>
+                      <a:rPr lang="ru-RU" sz="2000" b="0" i="1" spc="0" smtClean="0">
+                        <a:solidFill>
+                          <a:srgbClr val="FFFF00"/>
+                        </a:solidFill>
+                        <a:latin typeface="Cambria Math" panose="02040503050406030204" pitchFamily="18" charset="0"/>
+                        <a:ea typeface="Cambria Math" panose="02040503050406030204" pitchFamily="18" charset="0"/>
+                      </a:rPr>
+                      <m:t> −</m:t>
+                    </m:r>
+                    <m:r>
+                      <a:rPr lang="ru-RU" sz="2000" b="0" i="1" spc="0" smtClean="0">
+                        <a:solidFill>
+                          <a:srgbClr val="FFFF00"/>
+                        </a:solidFill>
+                        <a:latin typeface="Cambria Math" panose="02040503050406030204" pitchFamily="18" charset="0"/>
+                        <a:ea typeface="Cambria Math" panose="02040503050406030204" pitchFamily="18" charset="0"/>
+                      </a:rPr>
+                      <m:t>доп. параметр модели</m:t>
+                    </m:r>
+                    <m:r>
+                      <a:rPr lang="ru-RU" sz="2000" b="0" i="1" spc="0" smtClean="0">
+                        <a:solidFill>
+                          <a:srgbClr val="FFFF00"/>
+                        </a:solidFill>
+                        <a:latin typeface="Cambria Math" panose="02040503050406030204" pitchFamily="18" charset="0"/>
+                        <a:ea typeface="Cambria Math" panose="02040503050406030204" pitchFamily="18" charset="0"/>
+                      </a:rPr>
+                      <m:t>!</m:t>
                     </m:r>
                   </m:oMath>
                 </a14:m>
@@ -13392,7 +15559,7 @@
             </p:txBody>
           </p:sp>
         </mc:Choice>
-        <mc:Fallback xmlns="">
+        <mc:Fallback>
           <p:sp>
             <p:nvSpPr>
               <p:cNvPr id="2" name="Заголовок 1"/>
@@ -13518,8 +15685,8 @@
           </a:p>
         </p:txBody>
       </p:sp>
-      <mc:AlternateContent xmlns:mc="http://schemas.openxmlformats.org/markup-compatibility/2006" xmlns:a14="http://schemas.microsoft.com/office/drawing/2010/main">
-        <mc:Choice Requires="a14">
+      <mc:AlternateContent xmlns:mc="http://schemas.openxmlformats.org/markup-compatibility/2006">
+        <mc:Choice xmlns:a14="http://schemas.microsoft.com/office/drawing/2010/main" Requires="a14">
           <p:sp>
             <p:nvSpPr>
               <p:cNvPr id="5" name="TextBox 4"/>
@@ -13529,7 +15696,7 @@
             <p:spPr>
               <a:xfrm>
                 <a:off x="1509031" y="3747375"/>
-                <a:ext cx="8923148" cy="1359668"/>
+                <a:ext cx="10165475" cy="1359668"/>
               </a:xfrm>
               <a:prstGeom prst="rect">
                 <a:avLst/>
@@ -13755,7 +15922,58 @@
                     <a:ea typeface="Cambria Math" panose="02040503050406030204" pitchFamily="18" charset="0"/>
                     <a:cs typeface="+mj-cs"/>
                   </a:rPr>
-                  <a:t>плотность распределения пакетов пользователя</a:t>
+                  <a:t>плотность распределения пакетов </a:t>
+                </a:r>
+                <a:r>
+                  <a:rPr lang="ru-RU" dirty="0" smtClean="0">
+                    <a:solidFill>
+                      <a:srgbClr val="FFFF00"/>
+                    </a:solidFill>
+                    <a:effectLst>
+                      <a:outerShdw blurRad="469900" dist="342900" dir="5400000" sy="-20000" rotWithShape="0">
+                        <a:prstClr val="black">
+                          <a:alpha val="66000"/>
+                        </a:prstClr>
+                      </a:outerShdw>
+                    </a:effectLst>
+                    <a:ea typeface="Cambria Math" panose="02040503050406030204" pitchFamily="18" charset="0"/>
+                    <a:cs typeface="+mj-cs"/>
+                  </a:rPr>
+                  <a:t>пользователя</a:t>
+                </a:r>
+                <a:r>
+                  <a:rPr lang="en-US" dirty="0" smtClean="0">
+                    <a:solidFill>
+                      <a:srgbClr val="FFFF00"/>
+                    </a:solidFill>
+                    <a:effectLst>
+                      <a:outerShdw blurRad="469900" dist="342900" dir="5400000" sy="-20000" rotWithShape="0">
+                        <a:prstClr val="black">
+                          <a:alpha val="66000"/>
+                        </a:prstClr>
+                      </a:outerShdw>
+                    </a:effectLst>
+                    <a:ea typeface="Cambria Math" panose="02040503050406030204" pitchFamily="18" charset="0"/>
+                    <a:cs typeface="+mj-cs"/>
+                  </a:rPr>
+                  <a:t> </a:t>
+                </a:r>
+                <a:r>
+                  <a:rPr lang="ru-RU" dirty="0" smtClean="0">
+                    <a:solidFill>
+                      <a:srgbClr val="FFFF00"/>
+                    </a:solidFill>
+                    <a:effectLst>
+                      <a:outerShdw blurRad="469900" dist="342900" dir="5400000" sy="-20000" rotWithShape="0">
+                        <a:prstClr val="black">
+                          <a:alpha val="66000"/>
+                        </a:prstClr>
+                      </a:outerShdw>
+                    </a:effectLst>
+                    <a:ea typeface="Cambria Math" panose="02040503050406030204" pitchFamily="18" charset="0"/>
+                    <a:cs typeface="+mj-cs"/>
+                  </a:rPr>
+                  <a:t>и кластеров</a:t>
                 </a:r>
                 <a:r>
                   <a:rPr lang="en-US" sz="2400" i="1" dirty="0" smtClean="0">
@@ -14550,7 +16768,7 @@
             </p:txBody>
           </p:sp>
         </mc:Choice>
-        <mc:Fallback xmlns="">
+        <mc:Fallback>
           <p:sp>
             <p:nvSpPr>
               <p:cNvPr id="5" name="TextBox 4"/>
@@ -14562,7 +16780,7 @@
             <p:spPr>
               <a:xfrm>
                 <a:off x="1509031" y="3747375"/>
-                <a:ext cx="8923148" cy="1359668"/>
+                <a:ext cx="10165475" cy="1359668"/>
               </a:xfrm>
               <a:prstGeom prst="rect">
                 <a:avLst/>
@@ -14570,7 +16788,7 @@
               <a:blipFill rotWithShape="0">
                 <a:blip r:embed="rId3"/>
                 <a:stretch>
-                  <a:fillRect l="-3896" t="-3587" r="-2119" b="-12556"/>
+                  <a:fillRect l="-3419" t="-3587" r="-1740" b="-12556"/>
                 </a:stretch>
               </a:blipFill>
             </p:spPr>
@@ -15233,7 +17451,7 @@
                           <a:ea typeface="Cambria Math" panose="02040503050406030204" pitchFamily="18" charset="0"/>
                           <a:cs typeface="+mj-cs"/>
                         </a:rPr>
-                        <m:t> берем из обучающего </m:t>
+                        <m:t> берем из обучающего батча пакетов за</m:t>
                       </m:r>
                       <m:r>
                         <a:rPr lang="ru-RU" dirty="0">
@@ -15251,7 +17469,7 @@
                           <a:ea typeface="Cambria Math" panose="02040503050406030204" pitchFamily="18" charset="0"/>
                           <a:cs typeface="+mj-cs"/>
                         </a:rPr>
-                        <m:t>батча пакетов за время </m:t>
+                        <m:t> время </m:t>
                       </m:r>
                       <m:r>
                         <a:rPr lang="en-US" dirty="0">
@@ -15351,7 +17569,7 @@
 </p:sld>
 </file>
 
-<file path=ppt/slides/slide7.xml><?xml version="1.0" encoding="utf-8"?>
+<file path=ppt/slides/slide8.xml><?xml version="1.0" encoding="utf-8"?>
 <p:sld xmlns:a="http://schemas.openxmlformats.org/drawingml/2006/main" xmlns:r="http://schemas.openxmlformats.org/officeDocument/2006/relationships" xmlns:p="http://schemas.openxmlformats.org/presentationml/2006/main">
   <p:cSld>
     <p:spTree>
@@ -15423,8 +17641,8 @@
           </a:p>
         </p:txBody>
       </p:sp>
-      <mc:AlternateContent xmlns:mc="http://schemas.openxmlformats.org/markup-compatibility/2006">
-        <mc:Choice xmlns:a14="http://schemas.microsoft.com/office/drawing/2010/main" Requires="a14">
+      <mc:AlternateContent xmlns:mc="http://schemas.openxmlformats.org/markup-compatibility/2006" xmlns:a14="http://schemas.microsoft.com/office/drawing/2010/main">
+        <mc:Choice Requires="a14">
           <p:sp>
             <p:nvSpPr>
               <p:cNvPr id="11" name="TextBox 10"/>
@@ -16331,7 +18549,7 @@
             </p:txBody>
           </p:sp>
         </mc:Choice>
-        <mc:Fallback>
+        <mc:Fallback xmlns="">
           <p:sp>
             <p:nvSpPr>
               <p:cNvPr id="11" name="TextBox 10"/>
@@ -20353,7 +22571,7 @@
 </p:sld>
 </file>
 
-<file path=ppt/slides/slide8.xml><?xml version="1.0" encoding="utf-8"?>
+<file path=ppt/slides/slide9.xml><?xml version="1.0" encoding="utf-8"?>
 <p:sld xmlns:a="http://schemas.openxmlformats.org/drawingml/2006/main" xmlns:r="http://schemas.openxmlformats.org/officeDocument/2006/relationships" xmlns:p="http://schemas.openxmlformats.org/presentationml/2006/main">
   <p:cSld>
     <p:spTree>
@@ -23960,8 +26178,8 @@
           </a:p>
         </p:txBody>
       </p:sp>
-      <mc:AlternateContent xmlns:mc="http://schemas.openxmlformats.org/markup-compatibility/2006" xmlns:a14="http://schemas.microsoft.com/office/drawing/2010/main">
-        <mc:Choice Requires="a14">
+      <mc:AlternateContent xmlns:mc="http://schemas.openxmlformats.org/markup-compatibility/2006">
+        <mc:Choice xmlns:a14="http://schemas.microsoft.com/office/drawing/2010/main" Requires="a14">
           <p:sp>
             <p:nvSpPr>
               <p:cNvPr id="2" name="TextBox 1"/>
@@ -23970,7 +26188,7 @@
             </p:nvSpPr>
             <p:spPr>
               <a:xfrm>
-                <a:off x="1176245" y="4569665"/>
+                <a:off x="1938722" y="4528945"/>
                 <a:ext cx="3270895" cy="700961"/>
               </a:xfrm>
               <a:prstGeom prst="rect">
@@ -24911,7 +27129,7 @@
             </p:txBody>
           </p:sp>
         </mc:Choice>
-        <mc:Fallback xmlns="">
+        <mc:Fallback>
           <p:sp>
             <p:nvSpPr>
               <p:cNvPr id="2" name="TextBox 1"/>
@@ -24922,7 +27140,7 @@
             </p:nvSpPr>
             <p:spPr>
               <a:xfrm>
-                <a:off x="1176245" y="4569665"/>
+                <a:off x="1938722" y="4528945"/>
                 <a:ext cx="3270895" cy="700961"/>
               </a:xfrm>
               <a:prstGeom prst="rect">
@@ -24950,8 +27168,8 @@
           </p:sp>
         </mc:Fallback>
       </mc:AlternateContent>
-      <mc:AlternateContent xmlns:mc="http://schemas.openxmlformats.org/markup-compatibility/2006" xmlns:a14="http://schemas.microsoft.com/office/drawing/2010/main">
-        <mc:Choice Requires="a14">
+      <mc:AlternateContent xmlns:mc="http://schemas.openxmlformats.org/markup-compatibility/2006">
+        <mc:Choice xmlns:a14="http://schemas.microsoft.com/office/drawing/2010/main" Requires="a14">
           <p:sp>
             <p:nvSpPr>
               <p:cNvPr id="20" name="TextBox 19"/>
@@ -24960,7 +27178,7 @@
             </p:nvSpPr>
             <p:spPr>
               <a:xfrm>
-                <a:off x="1176245" y="5294770"/>
+                <a:off x="1938722" y="5254050"/>
                 <a:ext cx="3343223" cy="722827"/>
               </a:xfrm>
               <a:prstGeom prst="rect">
@@ -25854,7 +28072,7 @@
             </p:txBody>
           </p:sp>
         </mc:Choice>
-        <mc:Fallback xmlns="">
+        <mc:Fallback>
           <p:sp>
             <p:nvSpPr>
               <p:cNvPr id="20" name="TextBox 19"/>
@@ -25865,7 +28083,7 @@
             </p:nvSpPr>
             <p:spPr>
               <a:xfrm>
-                <a:off x="1176245" y="5294770"/>
+                <a:off x="1938722" y="5254050"/>
                 <a:ext cx="3343223" cy="722827"/>
               </a:xfrm>
               <a:prstGeom prst="rect">
@@ -25893,8 +28111,8 @@
           </p:sp>
         </mc:Fallback>
       </mc:AlternateContent>
-      <mc:AlternateContent xmlns:mc="http://schemas.openxmlformats.org/markup-compatibility/2006" xmlns:a14="http://schemas.microsoft.com/office/drawing/2010/main">
-        <mc:Choice Requires="a14">
+      <mc:AlternateContent xmlns:mc="http://schemas.openxmlformats.org/markup-compatibility/2006">
+        <mc:Choice xmlns:a14="http://schemas.microsoft.com/office/drawing/2010/main" Requires="a14">
           <p:sp>
             <p:nvSpPr>
               <p:cNvPr id="21" name="TextBox 20"/>
@@ -25903,7 +28121,7 @@
             </p:nvSpPr>
             <p:spPr>
               <a:xfrm>
-                <a:off x="5116636" y="4558731"/>
+                <a:off x="5879113" y="4518011"/>
                 <a:ext cx="3096168" cy="677365"/>
               </a:xfrm>
               <a:prstGeom prst="rect">
@@ -26719,7 +28937,7 @@
             </p:txBody>
           </p:sp>
         </mc:Choice>
-        <mc:Fallback xmlns="">
+        <mc:Fallback>
           <p:sp>
             <p:nvSpPr>
               <p:cNvPr id="21" name="TextBox 20"/>
@@ -26730,7 +28948,7 @@
             </p:nvSpPr>
             <p:spPr>
               <a:xfrm>
-                <a:off x="5116636" y="4558731"/>
+                <a:off x="5879113" y="4518011"/>
                 <a:ext cx="3096168" cy="677365"/>
               </a:xfrm>
               <a:prstGeom prst="rect">
@@ -26758,8 +28976,8 @@
           </p:sp>
         </mc:Fallback>
       </mc:AlternateContent>
-      <mc:AlternateContent xmlns:mc="http://schemas.openxmlformats.org/markup-compatibility/2006" xmlns:a14="http://schemas.microsoft.com/office/drawing/2010/main">
-        <mc:Choice Requires="a14">
+      <mc:AlternateContent xmlns:mc="http://schemas.openxmlformats.org/markup-compatibility/2006">
+        <mc:Choice xmlns:a14="http://schemas.microsoft.com/office/drawing/2010/main" Requires="a14">
           <p:sp>
             <p:nvSpPr>
               <p:cNvPr id="27" name="TextBox 26"/>
@@ -26768,7 +28986,7 @@
             </p:nvSpPr>
             <p:spPr>
               <a:xfrm>
-                <a:off x="5116636" y="5305358"/>
+                <a:off x="5879113" y="5264638"/>
                 <a:ext cx="3941400" cy="696666"/>
               </a:xfrm>
               <a:prstGeom prst="rect">
@@ -27760,7 +29978,7 @@
             </p:txBody>
           </p:sp>
         </mc:Choice>
-        <mc:Fallback xmlns="">
+        <mc:Fallback>
           <p:sp>
             <p:nvSpPr>
               <p:cNvPr id="27" name="TextBox 26"/>
@@ -27771,7 +29989,7 @@
             </p:nvSpPr>
             <p:spPr>
               <a:xfrm>
-                <a:off x="5116636" y="5305358"/>
+                <a:off x="5879113" y="5264638"/>
                 <a:ext cx="3941400" cy="696666"/>
               </a:xfrm>
               <a:prstGeom prst="rect">
@@ -27780,7 +29998,7 @@
               <a:blipFill rotWithShape="0">
                 <a:blip r:embed="rId10"/>
                 <a:stretch>
-                  <a:fillRect l="-5100" r="-5100" b="-94783"/>
+                  <a:fillRect l="-5100" r="-5100" b="-96491"/>
                 </a:stretch>
               </a:blipFill>
             </p:spPr>

</xml_diff>